<commit_message>
Add timing logs and 3-random
</commit_message>
<xml_diff>
--- a/fedml/figures.pptx
+++ b/fedml/figures.pptx
@@ -12,6 +12,7 @@
     <p:sldId id="261" r:id="rId6"/>
     <p:sldId id="262" r:id="rId7"/>
     <p:sldId id="263" r:id="rId8"/>
+    <p:sldId id="264" r:id="rId9"/>
   </p:sldIdLst>
   <p:sldSz cx="8229600" cy="8229600"/>
   <p:notesSz cx="6858000" cy="9144000"/>
@@ -249,7 +250,7 @@
           <a:p>
             <a:fld id="{65EDB62C-5D5A-401A-95AC-9B0E11F36E48}" type="datetimeFigureOut">
               <a:rPr lang="nl-NL" smtClean="0"/>
-              <a:t>4-4-2021</a:t>
+              <a:t>11-4-2021</a:t>
             </a:fld>
             <a:endParaRPr lang="nl-NL"/>
           </a:p>
@@ -419,7 +420,7 @@
           <a:p>
             <a:fld id="{65EDB62C-5D5A-401A-95AC-9B0E11F36E48}" type="datetimeFigureOut">
               <a:rPr lang="nl-NL" smtClean="0"/>
-              <a:t>4-4-2021</a:t>
+              <a:t>11-4-2021</a:t>
             </a:fld>
             <a:endParaRPr lang="nl-NL"/>
           </a:p>
@@ -599,7 +600,7 @@
           <a:p>
             <a:fld id="{65EDB62C-5D5A-401A-95AC-9B0E11F36E48}" type="datetimeFigureOut">
               <a:rPr lang="nl-NL" smtClean="0"/>
-              <a:t>4-4-2021</a:t>
+              <a:t>11-4-2021</a:t>
             </a:fld>
             <a:endParaRPr lang="nl-NL"/>
           </a:p>
@@ -769,7 +770,7 @@
           <a:p>
             <a:fld id="{65EDB62C-5D5A-401A-95AC-9B0E11F36E48}" type="datetimeFigureOut">
               <a:rPr lang="nl-NL" smtClean="0"/>
-              <a:t>4-4-2021</a:t>
+              <a:t>11-4-2021</a:t>
             </a:fld>
             <a:endParaRPr lang="nl-NL"/>
           </a:p>
@@ -1013,7 +1014,7 @@
           <a:p>
             <a:fld id="{65EDB62C-5D5A-401A-95AC-9B0E11F36E48}" type="datetimeFigureOut">
               <a:rPr lang="nl-NL" smtClean="0"/>
-              <a:t>4-4-2021</a:t>
+              <a:t>11-4-2021</a:t>
             </a:fld>
             <a:endParaRPr lang="nl-NL"/>
           </a:p>
@@ -1245,7 +1246,7 @@
           <a:p>
             <a:fld id="{65EDB62C-5D5A-401A-95AC-9B0E11F36E48}" type="datetimeFigureOut">
               <a:rPr lang="nl-NL" smtClean="0"/>
-              <a:t>4-4-2021</a:t>
+              <a:t>11-4-2021</a:t>
             </a:fld>
             <a:endParaRPr lang="nl-NL"/>
           </a:p>
@@ -1612,7 +1613,7 @@
           <a:p>
             <a:fld id="{65EDB62C-5D5A-401A-95AC-9B0E11F36E48}" type="datetimeFigureOut">
               <a:rPr lang="nl-NL" smtClean="0"/>
-              <a:t>4-4-2021</a:t>
+              <a:t>11-4-2021</a:t>
             </a:fld>
             <a:endParaRPr lang="nl-NL"/>
           </a:p>
@@ -1730,7 +1731,7 @@
           <a:p>
             <a:fld id="{65EDB62C-5D5A-401A-95AC-9B0E11F36E48}" type="datetimeFigureOut">
               <a:rPr lang="nl-NL" smtClean="0"/>
-              <a:t>4-4-2021</a:t>
+              <a:t>11-4-2021</a:t>
             </a:fld>
             <a:endParaRPr lang="nl-NL"/>
           </a:p>
@@ -1825,7 +1826,7 @@
           <a:p>
             <a:fld id="{65EDB62C-5D5A-401A-95AC-9B0E11F36E48}" type="datetimeFigureOut">
               <a:rPr lang="nl-NL" smtClean="0"/>
-              <a:t>4-4-2021</a:t>
+              <a:t>11-4-2021</a:t>
             </a:fld>
             <a:endParaRPr lang="nl-NL"/>
           </a:p>
@@ -2102,7 +2103,7 @@
           <a:p>
             <a:fld id="{65EDB62C-5D5A-401A-95AC-9B0E11F36E48}" type="datetimeFigureOut">
               <a:rPr lang="nl-NL" smtClean="0"/>
-              <a:t>4-4-2021</a:t>
+              <a:t>11-4-2021</a:t>
             </a:fld>
             <a:endParaRPr lang="nl-NL"/>
           </a:p>
@@ -2359,7 +2360,7 @@
           <a:p>
             <a:fld id="{65EDB62C-5D5A-401A-95AC-9B0E11F36E48}" type="datetimeFigureOut">
               <a:rPr lang="nl-NL" smtClean="0"/>
-              <a:t>4-4-2021</a:t>
+              <a:t>11-4-2021</a:t>
             </a:fld>
             <a:endParaRPr lang="nl-NL"/>
           </a:p>
@@ -2572,7 +2573,7 @@
           <a:p>
             <a:fld id="{65EDB62C-5D5A-401A-95AC-9B0E11F36E48}" type="datetimeFigureOut">
               <a:rPr lang="nl-NL" smtClean="0"/>
-              <a:t>4-4-2021</a:t>
+              <a:t>11-4-2021</a:t>
             </a:fld>
             <a:endParaRPr lang="nl-NL"/>
           </a:p>
@@ -3572,8 +3573,8 @@
           </a:p>
         </p:txBody>
       </p:sp>
-      <mc:AlternateContent xmlns:mc="http://schemas.openxmlformats.org/markup-compatibility/2006" xmlns:a14="http://schemas.microsoft.com/office/drawing/2010/main">
-        <mc:Choice Requires="a14">
+      <mc:AlternateContent xmlns:mc="http://schemas.openxmlformats.org/markup-compatibility/2006">
+        <mc:Choice xmlns:a14="http://schemas.microsoft.com/office/drawing/2010/main" Requires="a14">
           <p:sp>
             <p:nvSpPr>
               <p:cNvPr id="6" name="TextBox 5">
@@ -3603,7 +3604,9 @@
               <a:lstStyle/>
               <a:p>
                 <a:r>
-                  <a:rPr lang="nl-NL" sz="1100"/>
+                  <a:rPr lang="nl-NL" sz="1100">
+                    <a:latin typeface="NimbusRomNo9L" panose="00000500000000000000" pitchFamily="50" charset="0"/>
+                  </a:rPr>
                   <a:t>Available classes (= </a:t>
                 </a:r>
                 <a14:m>
@@ -3629,14 +3632,16 @@
                   </m:oMath>
                 </a14:m>
                 <a:r>
-                  <a:rPr lang="nl-NL" sz="1100"/>
+                  <a:rPr lang="nl-NL" sz="1100">
+                    <a:latin typeface="NimbusRomNo9L" panose="00000500000000000000" pitchFamily="50" charset="0"/>
+                  </a:rPr>
                   <a:t>)</a:t>
                 </a:r>
               </a:p>
             </p:txBody>
           </p:sp>
         </mc:Choice>
-        <mc:Fallback xmlns="">
+        <mc:Fallback>
           <p:sp>
             <p:nvSpPr>
               <p:cNvPr id="6" name="TextBox 5">
@@ -3662,7 +3667,7 @@
               <a:blipFill>
                 <a:blip r:embed="rId2"/>
                 <a:stretch>
-                  <a:fillRect b="-16279"/>
+                  <a:fillRect t="-2326" b="-13953"/>
                 </a:stretch>
               </a:blipFill>
             </p:spPr>
@@ -3681,8 +3686,8 @@
           </p:sp>
         </mc:Fallback>
       </mc:AlternateContent>
-      <mc:AlternateContent xmlns:mc="http://schemas.openxmlformats.org/markup-compatibility/2006" xmlns:a14="http://schemas.microsoft.com/office/drawing/2010/main">
-        <mc:Choice Requires="a14">
+      <mc:AlternateContent xmlns:mc="http://schemas.openxmlformats.org/markup-compatibility/2006">
+        <mc:Choice xmlns:a14="http://schemas.microsoft.com/office/drawing/2010/main" Requires="a14">
           <p:sp>
             <p:nvSpPr>
               <p:cNvPr id="7" name="TextBox 6">
@@ -3698,7 +3703,7 @@
             <p:spPr>
               <a:xfrm>
                 <a:off x="256853" y="806472"/>
-                <a:ext cx="2794571" cy="4217373"/>
+                <a:ext cx="2794571" cy="4319837"/>
               </a:xfrm>
               <a:prstGeom prst="rect">
                 <a:avLst/>
@@ -3737,7 +3742,9 @@
                   </m:oMath>
                 </a14:m>
                 <a:r>
-                  <a:rPr lang="nl-NL" sz="1100"/>
+                  <a:rPr lang="nl-NL" sz="1100">
+                    <a:latin typeface="NimbusRomNo9L" panose="00000500000000000000" pitchFamily="50" charset="0"/>
+                  </a:rPr>
                   <a:t> = random big prime number</a:t>
                 </a:r>
               </a:p>
@@ -3794,6 +3801,7 @@
                     <a:solidFill>
                       <a:srgbClr val="C00000"/>
                     </a:solidFill>
+                    <a:latin typeface="NimbusRomNo9L" panose="00000500000000000000" pitchFamily="50" charset="0"/>
                   </a:rPr>
                   <a:t> = </a:t>
                 </a:r>
@@ -3824,7 +3832,16 @@
                         </a:solidFill>
                         <a:latin typeface="Cambria Math" panose="02040503050406030204" pitchFamily="18" charset="0"/>
                       </a:rPr>
-                      <m:t> – 1</m:t>
+                      <m:t> </m:t>
+                    </m:r>
+                    <m:r>
+                      <a:rPr lang="nl-NL" sz="1100" i="1" smtClean="0">
+                        <a:solidFill>
+                          <a:schemeClr val="tx1"/>
+                        </a:solidFill>
+                        <a:latin typeface="Cambria Math" panose="02040503050406030204" pitchFamily="18" charset="0"/>
+                      </a:rPr>
+                      <m:t>– 1</m:t>
                     </m:r>
                   </m:oMath>
                 </a14:m>
@@ -3832,6 +3849,7 @@
                   <a:solidFill>
                     <a:srgbClr val="C00000"/>
                   </a:solidFill>
+                  <a:latin typeface="NimbusRomNo9L" panose="00000500000000000000" pitchFamily="50" charset="0"/>
                 </a:endParaRPr>
               </a:p>
               <a:p>
@@ -3862,11 +3880,14 @@
                     <a:solidFill>
                       <a:srgbClr val="C00000"/>
                     </a:solidFill>
+                    <a:latin typeface="NimbusRomNo9L" panose="00000500000000000000" pitchFamily="50" charset="0"/>
                   </a:rPr>
                   <a:t> </a:t>
                 </a:r>
                 <a:r>
-                  <a:rPr lang="nl-NL" sz="1100"/>
+                  <a:rPr lang="nl-NL" sz="1100">
+                    <a:latin typeface="NimbusRomNo9L" panose="00000500000000000000" pitchFamily="50" charset="0"/>
+                  </a:rPr>
                   <a:t>= random 32-bit integer that is invertible in modulus </a:t>
                 </a:r>
                 <a14:m>
@@ -3916,7 +3937,9 @@
                     </m:sSub>
                   </m:oMath>
                 </a14:m>
-                <a:endParaRPr lang="nl-NL" sz="1100"/>
+                <a:endParaRPr lang="nl-NL" sz="1100">
+                  <a:latin typeface="NimbusRomNo9L" panose="00000500000000000000" pitchFamily="50" charset="0"/>
+                </a:endParaRPr>
               </a:p>
               <a:p>
                 <a14:m>
@@ -3982,8 +4005,24 @@
                     <a:solidFill>
                       <a:srgbClr val="C00000"/>
                     </a:solidFill>
+                    <a:latin typeface="NimbusRomNo9L" panose="00000500000000000000" pitchFamily="50" charset="0"/>
                   </a:rPr>
-                  <a:t> = </a:t>
+                  <a:t> </a:t>
+                </a:r>
+                <a:r>
+                  <a:rPr lang="nl-NL" sz="1100">
+                    <a:latin typeface="NimbusRomNo9L" panose="00000500000000000000" pitchFamily="50" charset="0"/>
+                  </a:rPr>
+                  <a:t>=</a:t>
+                </a:r>
+                <a:r>
+                  <a:rPr lang="nl-NL" sz="1100">
+                    <a:solidFill>
+                      <a:srgbClr val="C00000"/>
+                    </a:solidFill>
+                    <a:latin typeface="NimbusRomNo9L" panose="00000500000000000000" pitchFamily="50" charset="0"/>
+                  </a:rPr>
+                  <a:t> </a:t>
                 </a:r>
                 <a14:m>
                   <m:oMath xmlns:m="http://schemas.openxmlformats.org/officeDocument/2006/math">
@@ -3992,7 +4031,7 @@
                         <m:ctrlPr>
                           <a:rPr lang="nl-NL" sz="1100" b="0" i="1" smtClean="0">
                             <a:solidFill>
-                              <a:srgbClr val="C00000"/>
+                              <a:schemeClr val="tx1"/>
                             </a:solidFill>
                             <a:latin typeface="Cambria Math" panose="02040503050406030204" pitchFamily="18" charset="0"/>
                           </a:rPr>
@@ -4002,7 +4041,7 @@
                         <m:r>
                           <a:rPr lang="nl-NL" sz="1100" b="0" i="0" smtClean="0">
                             <a:solidFill>
-                              <a:srgbClr val="C00000"/>
+                              <a:schemeClr val="tx1"/>
                             </a:solidFill>
                             <a:latin typeface="Cambria Math" panose="02040503050406030204" pitchFamily="18" charset="0"/>
                           </a:rPr>
@@ -4056,7 +4095,7 @@
                         <m:r>
                           <a:rPr lang="nl-NL" sz="1100" b="0" i="1" smtClean="0">
                             <a:solidFill>
-                              <a:srgbClr val="C00000"/>
+                              <a:schemeClr val="tx1"/>
                             </a:solidFill>
                             <a:latin typeface="Cambria Math" panose="02040503050406030204" pitchFamily="18" charset="0"/>
                           </a:rPr>
@@ -4065,7 +4104,7 @@
                         <m:r>
                           <a:rPr lang="nl-NL" sz="1100" b="0" i="1" smtClean="0">
                             <a:solidFill>
-                              <a:srgbClr val="C00000"/>
+                              <a:schemeClr val="tx1"/>
                             </a:solidFill>
                             <a:latin typeface="Cambria Math" panose="02040503050406030204" pitchFamily="18" charset="0"/>
                           </a:rPr>
@@ -4074,7 +4113,7 @@
                         <m:r>
                           <a:rPr lang="nl-NL" sz="1100" b="0" i="1" smtClean="0">
                             <a:solidFill>
-                              <a:srgbClr val="C00000"/>
+                              <a:schemeClr val="tx1"/>
                             </a:solidFill>
                             <a:latin typeface="Cambria Math" panose="02040503050406030204" pitchFamily="18" charset="0"/>
                           </a:rPr>
@@ -4083,7 +4122,7 @@
                         <m:sSub>
                           <m:sSubPr>
                             <m:ctrlPr>
-                              <a:rPr lang="nl-NL" sz="1100" i="1">
+                              <a:rPr lang="nl-NL" sz="1100" i="1" smtClean="0">
                                 <a:solidFill>
                                   <a:srgbClr val="C00000"/>
                                 </a:solidFill>
@@ -4127,11 +4166,15 @@
                     </m:f>
                   </m:oMath>
                 </a14:m>
-                <a:endParaRPr lang="nl-NL" sz="1100"/>
+                <a:endParaRPr lang="nl-NL" sz="1100">
+                  <a:latin typeface="NimbusRomNo9L" panose="00000500000000000000" pitchFamily="50" charset="0"/>
+                </a:endParaRPr>
               </a:p>
               <a:p>
                 <a:r>
-                  <a:rPr lang="nl-NL" sz="1100"/>
+                  <a:rPr lang="nl-NL" sz="1100">
+                    <a:latin typeface="NimbusRomNo9L" panose="00000500000000000000" pitchFamily="50" charset="0"/>
+                  </a:rPr>
                   <a:t>  1)    Encrypt each entry </a:t>
                 </a:r>
                 <a14:m>
@@ -4145,7 +4188,9 @@
                   </m:oMath>
                 </a14:m>
                 <a:r>
-                  <a:rPr lang="nl-NL" sz="1100"/>
+                  <a:rPr lang="nl-NL" sz="1100">
+                    <a:latin typeface="NimbusRomNo9L" panose="00000500000000000000" pitchFamily="50" charset="0"/>
+                  </a:rPr>
                   <a:t> in </a:t>
                 </a:r>
                 <a14:m>
@@ -4154,6 +4199,9 @@
                       <m:sSubPr>
                         <m:ctrlPr>
                           <a:rPr lang="nl-NL" sz="1100" b="0" i="1" smtClean="0">
+                            <a:solidFill>
+                              <a:srgbClr val="C00000"/>
+                            </a:solidFill>
                             <a:latin typeface="Cambria Math" panose="02040503050406030204" pitchFamily="18" charset="0"/>
                           </a:rPr>
                         </m:ctrlPr>
@@ -4161,6 +4209,9 @@
                       <m:e>
                         <m:r>
                           <a:rPr lang="nl-NL" sz="1100" b="0" i="1" smtClean="0">
+                            <a:solidFill>
+                              <a:srgbClr val="C00000"/>
+                            </a:solidFill>
                             <a:latin typeface="Cambria Math" panose="02040503050406030204" pitchFamily="18" charset="0"/>
                           </a:rPr>
                           <m:t>𝐶</m:t>
@@ -4169,6 +4220,9 @@
                       <m:sub>
                         <m:r>
                           <a:rPr lang="nl-NL" sz="1100" b="0" i="1" smtClean="0">
+                            <a:solidFill>
+                              <a:srgbClr val="C00000"/>
+                            </a:solidFill>
                             <a:latin typeface="Cambria Math" panose="02040503050406030204" pitchFamily="18" charset="0"/>
                           </a:rPr>
                           <m:t>1</m:t>
@@ -4184,7 +4238,9 @@
                   </m:oMath>
                 </a14:m>
                 <a:r>
-                  <a:rPr lang="nl-NL" sz="1100"/>
+                  <a:rPr lang="nl-NL" sz="1100">
+                    <a:latin typeface="NimbusRomNo9L" panose="00000500000000000000" pitchFamily="50" charset="0"/>
+                  </a:rPr>
                   <a:t> </a:t>
                 </a:r>
                 <a14:m>
@@ -4271,7 +4327,7 @@
                         <m:ctrlPr>
                           <a:rPr lang="nl-NL" sz="1100" b="0" i="1" smtClean="0">
                             <a:solidFill>
-                              <a:srgbClr val="C00000"/>
+                              <a:schemeClr val="tx1"/>
                             </a:solidFill>
                             <a:latin typeface="Cambria Math" panose="02040503050406030204" pitchFamily="18" charset="0"/>
                           </a:rPr>
@@ -4326,7 +4382,7 @@
                     <m:r>
                       <a:rPr lang="nl-NL" sz="1100" b="0" i="1" smtClean="0">
                         <a:solidFill>
-                          <a:srgbClr val="C00000"/>
+                          <a:schemeClr val="tx1"/>
                         </a:solidFill>
                         <a:latin typeface="Cambria Math" panose="02040503050406030204" pitchFamily="18" charset="0"/>
                       </a:rPr>
@@ -4414,7 +4470,7 @@
                     <m:r>
                       <a:rPr lang="nl-NL" sz="1100" b="0" i="1" smtClean="0">
                         <a:solidFill>
-                          <a:srgbClr val="C00000"/>
+                          <a:schemeClr val="tx1"/>
                         </a:solidFill>
                         <a:latin typeface="Cambria Math" panose="02040503050406030204" pitchFamily="18" charset="0"/>
                       </a:rPr>
@@ -4465,17 +4521,21 @@
                     </m:sSub>
                   </m:oMath>
                 </a14:m>
-                <a:endParaRPr lang="nl-NL" sz="1100" i="1"/>
+                <a:endParaRPr lang="nl-NL" sz="1100" i="1">
+                  <a:latin typeface="NimbusRomNo9L" panose="00000500000000000000" pitchFamily="50" charset="0"/>
+                </a:endParaRPr>
               </a:p>
               <a:p>
                 <a:r>
-                  <a:rPr lang="nl-NL" sz="1100"/>
+                  <a:rPr lang="nl-NL" sz="1100">
+                    <a:latin typeface="NimbusRomNo9L" panose="00000500000000000000" pitchFamily="50" charset="0"/>
+                  </a:rPr>
                   <a:t>  2)    Shuffle </a:t>
                 </a:r>
                 <a14:m>
                   <m:oMath xmlns:m="http://schemas.openxmlformats.org/officeDocument/2006/math">
                     <m:r>
-                      <a:rPr lang="nl-NL" sz="1100" b="0" i="1" smtClean="0">
+                      <a:rPr lang="nl-NL" sz="1100" i="1">
                         <a:solidFill>
                           <a:srgbClr val="BA2824"/>
                         </a:solidFill>
@@ -4486,7 +4546,7 @@
                     <m:sSub>
                       <m:sSubPr>
                         <m:ctrlPr>
-                          <a:rPr lang="nl-NL" sz="1100" b="0" i="1" smtClean="0">
+                          <a:rPr lang="nl-NL" sz="1100" i="1">
                             <a:solidFill>
                               <a:srgbClr val="BA2824"/>
                             </a:solidFill>
@@ -4496,7 +4556,7 @@
                       </m:sSubPr>
                       <m:e>
                         <m:r>
-                          <a:rPr lang="nl-NL" sz="1100" b="0" i="1" smtClean="0">
+                          <a:rPr lang="nl-NL" sz="1100" i="1">
                             <a:solidFill>
                               <a:srgbClr val="BA2824"/>
                             </a:solidFill>
@@ -4507,7 +4567,7 @@
                       </m:e>
                       <m:sub>
                         <m:r>
-                          <a:rPr lang="nl-NL" sz="1100" b="0" i="1" smtClean="0">
+                          <a:rPr lang="nl-NL" sz="1100" i="1">
                             <a:solidFill>
                               <a:srgbClr val="BA2824"/>
                             </a:solidFill>
@@ -4518,7 +4578,7 @@
                         <m:sSub>
                           <m:sSubPr>
                             <m:ctrlPr>
-                              <a:rPr lang="nl-NL" sz="1100" b="0" i="1" smtClean="0">
+                              <a:rPr lang="nl-NL" sz="1100" i="1">
                                 <a:solidFill>
                                   <a:srgbClr val="BA2824"/>
                                 </a:solidFill>
@@ -4528,7 +4588,7 @@
                           </m:sSubPr>
                           <m:e>
                             <m:r>
-                              <a:rPr lang="nl-NL" sz="1100" b="0" i="1" smtClean="0">
+                              <a:rPr lang="nl-NL" sz="1100" i="1">
                                 <a:solidFill>
                                   <a:srgbClr val="BA2824"/>
                                 </a:solidFill>
@@ -4539,7 +4599,7 @@
                           </m:e>
                           <m:sub>
                             <m:r>
-                              <a:rPr lang="nl-NL" sz="1100" b="0" i="1" smtClean="0">
+                              <a:rPr lang="nl-NL" sz="1100" i="1">
                                 <a:solidFill>
                                   <a:srgbClr val="BA2824"/>
                                 </a:solidFill>
@@ -4554,10 +4614,7 @@
                     <m:d>
                       <m:dPr>
                         <m:ctrlPr>
-                          <a:rPr lang="nl-NL" sz="1100" b="0" i="1" smtClean="0">
-                            <a:solidFill>
-                              <a:srgbClr val="BA2824"/>
-                            </a:solidFill>
+                          <a:rPr lang="nl-NL" sz="1100" i="1">
                             <a:latin typeface="Cambria Math" panose="02040503050406030204" pitchFamily="18" charset="0"/>
                           </a:rPr>
                         </m:ctrlPr>
@@ -4566,9 +4623,9 @@
                         <m:sSub>
                           <m:sSubPr>
                             <m:ctrlPr>
-                              <a:rPr lang="nl-NL" sz="1100" b="0" i="1" smtClean="0">
+                              <a:rPr lang="nl-NL" sz="1100" i="1">
                                 <a:solidFill>
-                                  <a:srgbClr val="BA2824"/>
+                                  <a:srgbClr val="C00000"/>
                                 </a:solidFill>
                                 <a:latin typeface="Cambria Math" panose="02040503050406030204" pitchFamily="18" charset="0"/>
                               </a:rPr>
@@ -4576,9 +4633,9 @@
                           </m:sSubPr>
                           <m:e>
                             <m:r>
-                              <a:rPr lang="nl-NL" sz="1100" b="0" i="1" smtClean="0">
+                              <a:rPr lang="nl-NL" sz="1100" i="1">
                                 <a:solidFill>
-                                  <a:srgbClr val="BA2824"/>
+                                  <a:srgbClr val="C00000"/>
                                 </a:solidFill>
                                 <a:latin typeface="Cambria Math" panose="02040503050406030204" pitchFamily="18" charset="0"/>
                               </a:rPr>
@@ -4587,9 +4644,9 @@
                           </m:e>
                           <m:sub>
                             <m:r>
-                              <a:rPr lang="nl-NL" sz="1100" b="0" i="1" smtClean="0">
+                              <a:rPr lang="nl-NL" sz="1100" i="1">
                                 <a:solidFill>
-                                  <a:srgbClr val="BA2824"/>
+                                  <a:srgbClr val="C00000"/>
                                 </a:solidFill>
                                 <a:latin typeface="Cambria Math" panose="02040503050406030204" pitchFamily="18" charset="0"/>
                               </a:rPr>
@@ -4601,20 +4658,28 @@
                     </m:d>
                   </m:oMath>
                 </a14:m>
-                <a:endParaRPr lang="nl-NL" sz="1100" b="0"/>
+                <a:endParaRPr lang="nl-NL" sz="1100" b="0">
+                  <a:latin typeface="NimbusRomNo9L" panose="00000500000000000000" pitchFamily="50" charset="0"/>
+                </a:endParaRPr>
               </a:p>
               <a:p>
                 <a:r>
-                  <a:rPr lang="nl-NL" sz="1100"/>
+                  <a:rPr lang="nl-NL" sz="1100">
+                    <a:latin typeface="NimbusRomNo9L" panose="00000500000000000000" pitchFamily="50" charset="0"/>
+                  </a:rPr>
                   <a:t>  3)    Send to peer 2</a:t>
                 </a:r>
               </a:p>
               <a:p>
-                <a:endParaRPr lang="nl-NL" sz="1100"/>
+                <a:endParaRPr lang="nl-NL" sz="1100">
+                  <a:latin typeface="NimbusRomNo9L" panose="00000500000000000000" pitchFamily="50" charset="0"/>
+                </a:endParaRPr>
               </a:p>
               <a:p>
                 <a:r>
-                  <a:rPr lang="nl-NL" sz="1100"/>
+                  <a:rPr lang="nl-NL" sz="1100">
+                    <a:latin typeface="NimbusRomNo9L" panose="00000500000000000000" pitchFamily="50" charset="0"/>
+                  </a:rPr>
                   <a:t>  7)    Decrypt each entry i in </a:t>
                 </a:r>
                 <a14:m>
@@ -4666,7 +4731,7 @@
                 </a14:m>
                 <a:r>
                   <a:rPr lang="nl-NL" sz="1100" b="0" i="0">
-                    <a:latin typeface="Cambria Math" panose="02040503050406030204" pitchFamily="18" charset="0"/>
+                    <a:latin typeface="NimbusRomNo9L" panose="00000500000000000000" pitchFamily="50" charset="0"/>
                   </a:rPr>
                   <a:t> </a:t>
                 </a:r>
@@ -4902,9 +4967,9 @@
                           <m:d>
                             <m:dPr>
                               <m:ctrlPr>
-                                <a:rPr lang="nl-NL" sz="1100" i="1">
+                                <a:rPr lang="nl-NL" sz="1100" i="1" smtClean="0">
                                   <a:solidFill>
-                                    <a:srgbClr val="C00000"/>
+                                    <a:schemeClr val="tx1"/>
                                   </a:solidFill>
                                   <a:latin typeface="Cambria Math" panose="02040503050406030204" pitchFamily="18" charset="0"/>
                                 </a:rPr>
@@ -4912,7 +4977,7 @@
                             </m:dPr>
                             <m:e>
                               <m:r>
-                                <a:rPr lang="nl-NL" sz="1100" i="1">
+                                <a:rPr lang="nl-NL" sz="1100" i="1" smtClean="0">
                                   <a:solidFill>
                                     <a:srgbClr val="C00000"/>
                                   </a:solidFill>
@@ -5099,7 +5164,7 @@
                       <m:r>
                         <a:rPr lang="nl-NL" sz="1100" b="0" i="1" smtClean="0">
                           <a:solidFill>
-                            <a:srgbClr val="C00000"/>
+                            <a:schemeClr val="tx1"/>
                           </a:solidFill>
                           <a:latin typeface="Cambria Math" panose="02040503050406030204" pitchFamily="18" charset="0"/>
                         </a:rPr>
@@ -5160,24 +5225,36 @@
                     </m:oMath>
                   </m:oMathPara>
                 </a14:m>
-                <a:endParaRPr lang="nl-NL" sz="1100"/>
+                <a:endParaRPr lang="nl-NL" sz="1100">
+                  <a:latin typeface="NimbusRomNo9L" panose="00000500000000000000" pitchFamily="50" charset="0"/>
+                </a:endParaRPr>
               </a:p>
               <a:p>
-                <a:endParaRPr lang="nl-NL" sz="1100"/>
+                <a:endParaRPr lang="nl-NL" sz="1100">
+                  <a:latin typeface="NimbusRomNo9L" panose="00000500000000000000" pitchFamily="50" charset="0"/>
+                </a:endParaRPr>
               </a:p>
               <a:p>
                 <a:pPr algn="ctr"/>
-                <a:endParaRPr lang="nl-NL" sz="1100"/>
+                <a:endParaRPr lang="nl-NL" sz="1100">
+                  <a:latin typeface="NimbusRomNo9L" panose="00000500000000000000" pitchFamily="50" charset="0"/>
+                </a:endParaRPr>
               </a:p>
               <a:p>
-                <a:endParaRPr lang="nl-NL" sz="1100"/>
+                <a:endParaRPr lang="nl-NL" sz="1100">
+                  <a:latin typeface="NimbusRomNo9L" panose="00000500000000000000" pitchFamily="50" charset="0"/>
+                </a:endParaRPr>
               </a:p>
               <a:p>
-                <a:endParaRPr lang="nl-NL" sz="1100"/>
+                <a:endParaRPr lang="nl-NL" sz="1100">
+                  <a:latin typeface="NimbusRomNo9L" panose="00000500000000000000" pitchFamily="50" charset="0"/>
+                </a:endParaRPr>
               </a:p>
               <a:p>
                 <a:r>
-                  <a:rPr lang="nl-NL" sz="1100"/>
+                  <a:rPr lang="nl-NL" sz="1100">
+                    <a:latin typeface="NimbusRomNo9L" panose="00000500000000000000" pitchFamily="50" charset="0"/>
+                  </a:rPr>
                   <a:t>  9)    Calculate </a:t>
                 </a:r>
                 <a14:m>
@@ -5188,32 +5265,14 @@
                       </a:rPr>
                       <m:t>𝐵𝐹</m:t>
                     </m:r>
-                    <m:r>
-                      <a:rPr lang="nl-NL" sz="1100" b="0" i="1" smtClean="0">
-                        <a:latin typeface="Cambria Math" panose="02040503050406030204" pitchFamily="18" charset="0"/>
-                      </a:rPr>
-                      <m:t>(</m:t>
-                    </m:r>
-                    <m:r>
-                      <a:rPr lang="nl-NL" sz="1100" b="0" i="1" smtClean="0">
-                        <a:solidFill>
-                          <a:schemeClr val="accent1"/>
-                        </a:solidFill>
-                        <a:latin typeface="Cambria Math" panose="02040503050406030204" pitchFamily="18" charset="0"/>
-                      </a:rPr>
-                      <m:t>𝐸𝑛</m:t>
-                    </m:r>
-                    <m:sSub>
-                      <m:sSubPr>
+                    <m:d>
+                      <m:dPr>
                         <m:ctrlPr>
                           <a:rPr lang="nl-NL" sz="1100" b="0" i="1" smtClean="0">
-                            <a:solidFill>
-                              <a:schemeClr val="accent1"/>
-                            </a:solidFill>
                             <a:latin typeface="Cambria Math" panose="02040503050406030204" pitchFamily="18" charset="0"/>
                           </a:rPr>
                         </m:ctrlPr>
-                      </m:sSubPr>
+                      </m:dPr>
                       <m:e>
                         <m:r>
                           <a:rPr lang="nl-NL" sz="1100" b="0" i="1" smtClean="0">
@@ -5222,18 +5281,7 @@
                             </a:solidFill>
                             <a:latin typeface="Cambria Math" panose="02040503050406030204" pitchFamily="18" charset="0"/>
                           </a:rPr>
-                          <m:t>𝑐</m:t>
-                        </m:r>
-                      </m:e>
-                      <m:sub>
-                        <m:r>
-                          <a:rPr lang="nl-NL" sz="1100" b="0" i="1" smtClean="0">
-                            <a:solidFill>
-                              <a:schemeClr val="accent1"/>
-                            </a:solidFill>
-                            <a:latin typeface="Cambria Math" panose="02040503050406030204" pitchFamily="18" charset="0"/>
-                          </a:rPr>
-                          <m:t>𝑠𝑒𝑐𝑟𝑒</m:t>
+                          <m:t>𝐸𝑛</m:t>
                         </m:r>
                         <m:sSub>
                           <m:sSubPr>
@@ -5254,7 +5302,7 @@
                                 </a:solidFill>
                                 <a:latin typeface="Cambria Math" panose="02040503050406030204" pitchFamily="18" charset="0"/>
                               </a:rPr>
-                              <m:t>𝑡</m:t>
+                              <m:t>𝑐</m:t>
                             </m:r>
                           </m:e>
                           <m:sub>
@@ -5265,73 +5313,103 @@
                                 </a:solidFill>
                                 <a:latin typeface="Cambria Math" panose="02040503050406030204" pitchFamily="18" charset="0"/>
                               </a:rPr>
-                              <m:t>2</m:t>
+                              <m:t>𝑠𝑒𝑐𝑟𝑒</m:t>
                             </m:r>
+                            <m:sSub>
+                              <m:sSubPr>
+                                <m:ctrlPr>
+                                  <a:rPr lang="nl-NL" sz="1100" b="0" i="1" smtClean="0">
+                                    <a:solidFill>
+                                      <a:schemeClr val="accent1"/>
+                                    </a:solidFill>
+                                    <a:latin typeface="Cambria Math" panose="02040503050406030204" pitchFamily="18" charset="0"/>
+                                  </a:rPr>
+                                </m:ctrlPr>
+                              </m:sSubPr>
+                              <m:e>
+                                <m:r>
+                                  <a:rPr lang="nl-NL" sz="1100" b="0" i="1" smtClean="0">
+                                    <a:solidFill>
+                                      <a:schemeClr val="accent1"/>
+                                    </a:solidFill>
+                                    <a:latin typeface="Cambria Math" panose="02040503050406030204" pitchFamily="18" charset="0"/>
+                                  </a:rPr>
+                                  <m:t>𝑡</m:t>
+                                </m:r>
+                              </m:e>
+                              <m:sub>
+                                <m:r>
+                                  <a:rPr lang="nl-NL" sz="1100" b="0" i="1" smtClean="0">
+                                    <a:solidFill>
+                                      <a:schemeClr val="accent1"/>
+                                    </a:solidFill>
+                                    <a:latin typeface="Cambria Math" panose="02040503050406030204" pitchFamily="18" charset="0"/>
+                                  </a:rPr>
+                                  <m:t>2</m:t>
+                                </m:r>
+                              </m:sub>
+                            </m:sSub>
                           </m:sub>
                         </m:sSub>
-                      </m:sub>
-                    </m:sSub>
-                    <m:r>
-                      <a:rPr lang="nl-NL" sz="1100" b="0" i="1" smtClean="0">
-                        <a:solidFill>
-                          <a:srgbClr val="C00000"/>
-                        </a:solidFill>
-                        <a:latin typeface="Cambria Math" panose="02040503050406030204" pitchFamily="18" charset="0"/>
-                      </a:rPr>
-                      <m:t>(</m:t>
-                    </m:r>
-                    <m:sSub>
-                      <m:sSubPr>
-                        <m:ctrlPr>
-                          <a:rPr lang="nl-NL" sz="1100" b="0" i="1" smtClean="0">
-                            <a:solidFill>
-                              <a:srgbClr val="C00000"/>
-                            </a:solidFill>
-                            <a:latin typeface="Cambria Math" panose="02040503050406030204" pitchFamily="18" charset="0"/>
-                          </a:rPr>
-                        </m:ctrlPr>
-                      </m:sSubPr>
-                      <m:e>
-                        <m:r>
-                          <a:rPr lang="nl-NL" sz="1100" b="0" i="1" smtClean="0">
-                            <a:solidFill>
-                              <a:srgbClr val="C00000"/>
-                            </a:solidFill>
-                            <a:latin typeface="Cambria Math" panose="02040503050406030204" pitchFamily="18" charset="0"/>
-                          </a:rPr>
-                          <m:t>𝐶</m:t>
-                        </m:r>
+                        <m:d>
+                          <m:dPr>
+                            <m:ctrlPr>
+                              <a:rPr lang="nl-NL" sz="1100" b="0" i="1" smtClean="0">
+                                <a:solidFill>
+                                  <a:schemeClr val="tx1"/>
+                                </a:solidFill>
+                                <a:latin typeface="Cambria Math" panose="02040503050406030204" pitchFamily="18" charset="0"/>
+                              </a:rPr>
+                            </m:ctrlPr>
+                          </m:dPr>
+                          <m:e>
+                            <m:sSub>
+                              <m:sSubPr>
+                                <m:ctrlPr>
+                                  <a:rPr lang="nl-NL" sz="1100" b="0" i="1" smtClean="0">
+                                    <a:solidFill>
+                                      <a:srgbClr val="C00000"/>
+                                    </a:solidFill>
+                                    <a:latin typeface="Cambria Math" panose="02040503050406030204" pitchFamily="18" charset="0"/>
+                                  </a:rPr>
+                                </m:ctrlPr>
+                              </m:sSubPr>
+                              <m:e>
+                                <m:r>
+                                  <a:rPr lang="nl-NL" sz="1100" b="0" i="1" smtClean="0">
+                                    <a:solidFill>
+                                      <a:srgbClr val="C00000"/>
+                                    </a:solidFill>
+                                    <a:latin typeface="Cambria Math" panose="02040503050406030204" pitchFamily="18" charset="0"/>
+                                  </a:rPr>
+                                  <m:t>𝐶</m:t>
+                                </m:r>
+                              </m:e>
+                              <m:sub>
+                                <m:r>
+                                  <a:rPr lang="nl-NL" sz="1100" b="0" i="1" smtClean="0">
+                                    <a:solidFill>
+                                      <a:srgbClr val="C00000"/>
+                                    </a:solidFill>
+                                    <a:latin typeface="Cambria Math" panose="02040503050406030204" pitchFamily="18" charset="0"/>
+                                  </a:rPr>
+                                  <m:t>1, </m:t>
+                                </m:r>
+                                <m:r>
+                                  <a:rPr lang="nl-NL" sz="1100" b="0" i="1" smtClean="0">
+                                    <a:solidFill>
+                                      <a:srgbClr val="C00000"/>
+                                    </a:solidFill>
+                                    <a:latin typeface="Cambria Math" panose="02040503050406030204" pitchFamily="18" charset="0"/>
+                                  </a:rPr>
+                                  <m:t>𝑖</m:t>
+                                </m:r>
+                              </m:sub>
+                            </m:sSub>
+                          </m:e>
+                        </m:d>
                       </m:e>
-                      <m:sub>
-                        <m:r>
-                          <a:rPr lang="nl-NL" sz="1100" b="0" i="1" smtClean="0">
-                            <a:solidFill>
-                              <a:srgbClr val="C00000"/>
-                            </a:solidFill>
-                            <a:latin typeface="Cambria Math" panose="02040503050406030204" pitchFamily="18" charset="0"/>
-                          </a:rPr>
-                          <m:t>1, </m:t>
-                        </m:r>
-                        <m:r>
-                          <a:rPr lang="nl-NL" sz="1100" b="0" i="1" smtClean="0">
-                            <a:solidFill>
-                              <a:srgbClr val="C00000"/>
-                            </a:solidFill>
-                            <a:latin typeface="Cambria Math" panose="02040503050406030204" pitchFamily="18" charset="0"/>
-                          </a:rPr>
-                          <m:t>𝑖</m:t>
-                        </m:r>
-                      </m:sub>
-                    </m:sSub>
-                    <m:r>
-                      <a:rPr lang="nl-NL" sz="1100" b="0" i="1" smtClean="0">
-                        <a:solidFill>
-                          <a:srgbClr val="C00000"/>
-                        </a:solidFill>
-                        <a:latin typeface="Cambria Math" panose="02040503050406030204" pitchFamily="18" charset="0"/>
-                      </a:rPr>
-                      <m:t>)</m:t>
-                    </m:r>
+                    </m:d>
                   </m:oMath>
                 </a14:m>
                 <a:r>
@@ -5339,11 +5417,14 @@
                     <a:solidFill>
                       <a:srgbClr val="C00000"/>
                     </a:solidFill>
+                    <a:latin typeface="NimbusRomNo9L" panose="00000500000000000000" pitchFamily="50" charset="0"/>
                   </a:rPr>
                   <a:t> </a:t>
                 </a:r>
                 <a:r>
-                  <a:rPr lang="nl-NL" sz="1100"/>
+                  <a:rPr lang="nl-NL" sz="1100">
+                    <a:latin typeface="NimbusRomNo9L" panose="00000500000000000000" pitchFamily="50" charset="0"/>
+                  </a:rPr>
                   <a:t>for each entry </a:t>
                 </a:r>
                 <a14:m>
@@ -5357,7 +5438,9 @@
                   </m:oMath>
                 </a14:m>
                 <a:r>
-                  <a:rPr lang="nl-NL" sz="1100"/>
+                  <a:rPr lang="nl-NL" sz="1100">
+                    <a:latin typeface="NimbusRomNo9L" panose="00000500000000000000" pitchFamily="50" charset="0"/>
+                  </a:rPr>
                   <a:t> in </a:t>
                 </a:r>
                 <a14:m>
@@ -5398,15 +5481,21 @@
                     </m:sSub>
                   </m:oMath>
                 </a14:m>
-                <a:endParaRPr lang="nl-NL" sz="1100"/>
+                <a:endParaRPr lang="nl-NL" sz="1100">
+                  <a:latin typeface="NimbusRomNo9L" panose="00000500000000000000" pitchFamily="50" charset="0"/>
+                </a:endParaRPr>
               </a:p>
               <a:p>
                 <a:r>
-                  <a:rPr lang="nl-NL" sz="1100"/>
+                  <a:rPr lang="nl-NL" sz="1100">
+                    <a:latin typeface="NimbusRomNo9L" panose="00000500000000000000" pitchFamily="50" charset="0"/>
+                  </a:rPr>
                   <a:t>  10)    Check for matches with</a:t>
                 </a:r>
                 <a:r>
-                  <a:rPr lang="nl-NL" sz="1100" b="0"/>
+                  <a:rPr lang="nl-NL" sz="1100" b="0">
+                    <a:latin typeface="NimbusRomNo9L" panose="00000500000000000000" pitchFamily="50" charset="0"/>
+                  </a:rPr>
                   <a:t> </a:t>
                 </a:r>
                 <a14:m>
@@ -5508,7 +5597,7 @@
                             <m:ctrlPr>
                               <a:rPr lang="nl-NL" sz="1100" b="0" i="1" smtClean="0">
                                 <a:solidFill>
-                                  <a:schemeClr val="accent1"/>
+                                  <a:schemeClr val="tx1"/>
                                 </a:solidFill>
                                 <a:latin typeface="Cambria Math" panose="02040503050406030204" pitchFamily="18" charset="0"/>
                               </a:rPr>
@@ -5555,18 +5644,22 @@
                     </m:d>
                   </m:oMath>
                 </a14:m>
-                <a:endParaRPr lang="nl-NL" sz="1100"/>
+                <a:endParaRPr lang="nl-NL" sz="1100">
+                  <a:latin typeface="NimbusRomNo9L" panose="00000500000000000000" pitchFamily="50" charset="0"/>
+                </a:endParaRPr>
               </a:p>
               <a:p>
                 <a:r>
-                  <a:rPr lang="nl-NL" sz="1100"/>
+                  <a:rPr lang="nl-NL" sz="1100">
+                    <a:latin typeface="NimbusRomNo9L" panose="00000500000000000000" pitchFamily="50" charset="0"/>
+                  </a:rPr>
                   <a:t>  11)   Get cardinality of intersections</a:t>
                 </a:r>
               </a:p>
             </p:txBody>
           </p:sp>
         </mc:Choice>
-        <mc:Fallback xmlns="">
+        <mc:Fallback>
           <p:sp>
             <p:nvSpPr>
               <p:cNvPr id="7" name="TextBox 6">
@@ -5584,7 +5677,7 @@
             <p:spPr>
               <a:xfrm>
                 <a:off x="256853" y="806472"/>
-                <a:ext cx="2794571" cy="4217373"/>
+                <a:ext cx="2794571" cy="4319837"/>
               </a:xfrm>
               <a:prstGeom prst="rect">
                 <a:avLst/>
@@ -5592,7 +5685,7 @@
               <a:blipFill>
                 <a:blip r:embed="rId3"/>
                 <a:stretch>
-                  <a:fillRect r="-2832" b="-723"/>
+                  <a:fillRect t="-141" r="-2832"/>
                 </a:stretch>
               </a:blipFill>
               <a:ln>
@@ -5723,7 +5816,9 @@
           <a:lstStyle/>
           <a:p>
             <a:r>
-              <a:rPr lang="nl-NL" sz="1100"/>
+              <a:rPr lang="nl-NL" sz="1100">
+                <a:latin typeface="NimbusRomNo9L" panose="00000500000000000000" pitchFamily="50" charset="0"/>
+              </a:rPr>
               <a:t>Available classes (= </a:t>
             </a:r>
             <a:r>
@@ -5731,6 +5826,7 @@
                 <a:solidFill>
                   <a:schemeClr val="accent1"/>
                 </a:solidFill>
+                <a:latin typeface="NimbusRomNo9L" panose="00000500000000000000" pitchFamily="50" charset="0"/>
               </a:rPr>
               <a:t>C</a:t>
             </a:r>
@@ -5739,18 +5835,21 @@
                 <a:solidFill>
                   <a:schemeClr val="accent1"/>
                 </a:solidFill>
+                <a:latin typeface="NimbusRomNo9L" panose="00000500000000000000" pitchFamily="50" charset="0"/>
               </a:rPr>
               <a:t>2</a:t>
             </a:r>
             <a:r>
-              <a:rPr lang="nl-NL" sz="1100"/>
+              <a:rPr lang="nl-NL" sz="1100">
+                <a:latin typeface="NimbusRomNo9L" panose="00000500000000000000" pitchFamily="50" charset="0"/>
+              </a:rPr>
               <a:t>)</a:t>
             </a:r>
           </a:p>
         </p:txBody>
       </p:sp>
-      <mc:AlternateContent xmlns:mc="http://schemas.openxmlformats.org/markup-compatibility/2006" xmlns:a14="http://schemas.microsoft.com/office/drawing/2010/main">
-        <mc:Choice Requires="a14">
+      <mc:AlternateContent xmlns:mc="http://schemas.openxmlformats.org/markup-compatibility/2006">
+        <mc:Choice xmlns:a14="http://schemas.microsoft.com/office/drawing/2010/main" Requires="a14">
           <p:sp>
             <p:nvSpPr>
               <p:cNvPr id="11" name="TextBox 10">
@@ -5802,7 +5901,9 @@
                   </m:oMath>
                 </a14:m>
                 <a:r>
-                  <a:rPr lang="nl-NL" sz="1100"/>
+                  <a:rPr lang="nl-NL" sz="1100">
+                    <a:latin typeface="NimbusRomNo9L" panose="00000500000000000000" pitchFamily="50" charset="0"/>
+                  </a:rPr>
                   <a:t> = random big prime number</a:t>
                 </a:r>
               </a:p>
@@ -5859,6 +5960,7 @@
                     <a:solidFill>
                       <a:schemeClr val="accent1"/>
                     </a:solidFill>
+                    <a:latin typeface="NimbusRomNo9L" panose="00000500000000000000" pitchFamily="50" charset="0"/>
                   </a:rPr>
                   <a:t> = </a:t>
                 </a:r>
@@ -5889,7 +5991,16 @@
                         </a:solidFill>
                         <a:latin typeface="Cambria Math" panose="02040503050406030204" pitchFamily="18" charset="0"/>
                       </a:rPr>
-                      <m:t> – 1</m:t>
+                      <m:t> </m:t>
+                    </m:r>
+                    <m:r>
+                      <a:rPr lang="nl-NL" sz="1100" i="1" smtClean="0">
+                        <a:solidFill>
+                          <a:schemeClr val="tx1"/>
+                        </a:solidFill>
+                        <a:latin typeface="Cambria Math" panose="02040503050406030204" pitchFamily="18" charset="0"/>
+                      </a:rPr>
+                      <m:t>– 1</m:t>
                     </m:r>
                   </m:oMath>
                 </a14:m>
@@ -5897,6 +6008,7 @@
                   <a:solidFill>
                     <a:schemeClr val="accent1"/>
                   </a:solidFill>
+                  <a:latin typeface="NimbusRomNo9L" panose="00000500000000000000" pitchFamily="50" charset="0"/>
                 </a:endParaRPr>
               </a:p>
               <a:p>
@@ -5927,11 +6039,14 @@
                     <a:solidFill>
                       <a:schemeClr val="accent1"/>
                     </a:solidFill>
+                    <a:latin typeface="NimbusRomNo9L" panose="00000500000000000000" pitchFamily="50" charset="0"/>
                   </a:rPr>
                   <a:t> </a:t>
                 </a:r>
                 <a:r>
-                  <a:rPr lang="nl-NL" sz="1100"/>
+                  <a:rPr lang="nl-NL" sz="1100">
+                    <a:latin typeface="NimbusRomNo9L" panose="00000500000000000000" pitchFamily="50" charset="0"/>
+                  </a:rPr>
                   <a:t>= random 32-bit integer that is invertible in modulus </a:t>
                 </a:r>
                 <a14:m>
@@ -5981,7 +6096,9 @@
                     </m:sSub>
                   </m:oMath>
                 </a14:m>
-                <a:endParaRPr lang="nl-NL" sz="1100"/>
+                <a:endParaRPr lang="nl-NL" sz="1100">
+                  <a:latin typeface="NimbusRomNo9L" panose="00000500000000000000" pitchFamily="50" charset="0"/>
+                </a:endParaRPr>
               </a:p>
               <a:p>
                 <a14:m>
@@ -6047,8 +6164,24 @@
                     <a:solidFill>
                       <a:schemeClr val="accent1"/>
                     </a:solidFill>
+                    <a:latin typeface="NimbusRomNo9L" panose="00000500000000000000" pitchFamily="50" charset="0"/>
                   </a:rPr>
-                  <a:t> = </a:t>
+                  <a:t> </a:t>
+                </a:r>
+                <a:r>
+                  <a:rPr lang="nl-NL" sz="1100">
+                    <a:latin typeface="NimbusRomNo9L" panose="00000500000000000000" pitchFamily="50" charset="0"/>
+                  </a:rPr>
+                  <a:t>=</a:t>
+                </a:r>
+                <a:r>
+                  <a:rPr lang="nl-NL" sz="1100">
+                    <a:solidFill>
+                      <a:schemeClr val="accent1"/>
+                    </a:solidFill>
+                    <a:latin typeface="NimbusRomNo9L" panose="00000500000000000000" pitchFamily="50" charset="0"/>
+                  </a:rPr>
+                  <a:t> </a:t>
                 </a:r>
                 <a14:m>
                   <m:oMath xmlns:m="http://schemas.openxmlformats.org/officeDocument/2006/math">
@@ -6057,7 +6190,7 @@
                         <m:ctrlPr>
                           <a:rPr lang="nl-NL" sz="1100" b="0" i="1" smtClean="0">
                             <a:solidFill>
-                              <a:schemeClr val="accent1"/>
+                              <a:schemeClr val="tx1"/>
                             </a:solidFill>
                             <a:latin typeface="Cambria Math" panose="02040503050406030204" pitchFamily="18" charset="0"/>
                           </a:rPr>
@@ -6067,7 +6200,7 @@
                         <m:r>
                           <a:rPr lang="nl-NL" sz="1100" b="0" i="0" smtClean="0">
                             <a:solidFill>
-                              <a:schemeClr val="accent1"/>
+                              <a:schemeClr val="tx1"/>
                             </a:solidFill>
                             <a:latin typeface="Cambria Math" panose="02040503050406030204" pitchFamily="18" charset="0"/>
                           </a:rPr>
@@ -6121,7 +6254,7 @@
                         <m:r>
                           <a:rPr lang="nl-NL" sz="1100" b="0" i="1" smtClean="0">
                             <a:solidFill>
-                              <a:schemeClr val="accent1"/>
+                              <a:schemeClr val="tx1"/>
                             </a:solidFill>
                             <a:latin typeface="Cambria Math" panose="02040503050406030204" pitchFamily="18" charset="0"/>
                           </a:rPr>
@@ -6130,7 +6263,7 @@
                         <m:r>
                           <a:rPr lang="nl-NL" sz="1100" b="0" i="1" smtClean="0">
                             <a:solidFill>
-                              <a:schemeClr val="accent1"/>
+                              <a:schemeClr val="tx1"/>
                             </a:solidFill>
                             <a:latin typeface="Cambria Math" panose="02040503050406030204" pitchFamily="18" charset="0"/>
                           </a:rPr>
@@ -6139,7 +6272,7 @@
                         <m:r>
                           <a:rPr lang="nl-NL" sz="1100" b="0" i="1" smtClean="0">
                             <a:solidFill>
-                              <a:schemeClr val="accent1"/>
+                              <a:schemeClr val="tx1"/>
                             </a:solidFill>
                             <a:latin typeface="Cambria Math" panose="02040503050406030204" pitchFamily="18" charset="0"/>
                           </a:rPr>
@@ -6148,7 +6281,7 @@
                         <m:sSub>
                           <m:sSubPr>
                             <m:ctrlPr>
-                              <a:rPr lang="nl-NL" sz="1100" i="1">
+                              <a:rPr lang="nl-NL" sz="1100" i="1" smtClean="0">
                                 <a:solidFill>
                                   <a:schemeClr val="accent1"/>
                                 </a:solidFill>
@@ -6192,14 +6325,20 @@
                     </m:f>
                   </m:oMath>
                 </a14:m>
-                <a:endParaRPr lang="nl-NL" sz="1100"/>
+                <a:endParaRPr lang="nl-NL" sz="1100">
+                  <a:latin typeface="NimbusRomNo9L" panose="00000500000000000000" pitchFamily="50" charset="0"/>
+                </a:endParaRPr>
               </a:p>
               <a:p>
-                <a:endParaRPr lang="nl-NL" sz="1100"/>
+                <a:endParaRPr lang="nl-NL" sz="1100">
+                  <a:latin typeface="NimbusRomNo9L" panose="00000500000000000000" pitchFamily="50" charset="0"/>
+                </a:endParaRPr>
               </a:p>
               <a:p>
                 <a:r>
-                  <a:rPr lang="nl-NL" sz="1100"/>
+                  <a:rPr lang="nl-NL" sz="1100">
+                    <a:latin typeface="NimbusRomNo9L" panose="00000500000000000000" pitchFamily="50" charset="0"/>
+                  </a:rPr>
                   <a:t>  4)    Shuffle </a:t>
                 </a:r>
                 <a14:m>
@@ -6207,7 +6346,7 @@
                     <m:r>
                       <a:rPr lang="nl-NL" sz="1100" b="0" i="1" smtClean="0">
                         <a:solidFill>
-                          <a:srgbClr val="C00000"/>
+                          <a:srgbClr val="BA2824"/>
                         </a:solidFill>
                         <a:latin typeface="Cambria Math" panose="02040503050406030204" pitchFamily="18" charset="0"/>
                       </a:rPr>
@@ -6218,7 +6357,7 @@
                         <m:ctrlPr>
                           <a:rPr lang="nl-NL" sz="1100" b="0" i="1" smtClean="0">
                             <a:solidFill>
-                              <a:srgbClr val="C00000"/>
+                              <a:srgbClr val="BA2824"/>
                             </a:solidFill>
                             <a:latin typeface="Cambria Math" panose="02040503050406030204" pitchFamily="18" charset="0"/>
                           </a:rPr>
@@ -6228,7 +6367,7 @@
                         <m:r>
                           <a:rPr lang="nl-NL" sz="1100" b="0" i="1" smtClean="0">
                             <a:solidFill>
-                              <a:srgbClr val="C00000"/>
+                              <a:srgbClr val="BA2824"/>
                             </a:solidFill>
                             <a:latin typeface="Cambria Math" panose="02040503050406030204" pitchFamily="18" charset="0"/>
                           </a:rPr>
@@ -6239,7 +6378,7 @@
                         <m:r>
                           <a:rPr lang="nl-NL" sz="1100" b="0" i="1" smtClean="0">
                             <a:solidFill>
-                              <a:srgbClr val="C00000"/>
+                              <a:srgbClr val="BA2824"/>
                             </a:solidFill>
                             <a:latin typeface="Cambria Math" panose="02040503050406030204" pitchFamily="18" charset="0"/>
                           </a:rPr>
@@ -6250,7 +6389,7 @@
                             <m:ctrlPr>
                               <a:rPr lang="nl-NL" sz="1100" b="0" i="1" smtClean="0">
                                 <a:solidFill>
-                                  <a:srgbClr val="C00000"/>
+                                  <a:srgbClr val="BA2824"/>
                                 </a:solidFill>
                                 <a:latin typeface="Cambria Math" panose="02040503050406030204" pitchFamily="18" charset="0"/>
                               </a:rPr>
@@ -6260,7 +6399,7 @@
                             <m:r>
                               <a:rPr lang="nl-NL" sz="1100" b="0" i="1" smtClean="0">
                                 <a:solidFill>
-                                  <a:srgbClr val="C00000"/>
+                                  <a:srgbClr val="BA2824"/>
                                 </a:solidFill>
                                 <a:latin typeface="Cambria Math" panose="02040503050406030204" pitchFamily="18" charset="0"/>
                               </a:rPr>
@@ -6271,7 +6410,7 @@
                             <m:r>
                               <a:rPr lang="nl-NL" sz="1100" b="0" i="1" smtClean="0">
                                 <a:solidFill>
-                                  <a:srgbClr val="C00000"/>
+                                  <a:srgbClr val="BA2824"/>
                                 </a:solidFill>
                                 <a:latin typeface="Cambria Math" panose="02040503050406030204" pitchFamily="18" charset="0"/>
                               </a:rPr>
@@ -6286,7 +6425,7 @@
                         <m:ctrlPr>
                           <a:rPr lang="nl-NL" sz="1100" b="0" i="1" smtClean="0">
                             <a:solidFill>
-                              <a:srgbClr val="C00000"/>
+                              <a:schemeClr val="tx1"/>
                             </a:solidFill>
                             <a:latin typeface="Cambria Math" panose="02040503050406030204" pitchFamily="18" charset="0"/>
                           </a:rPr>
@@ -6331,11 +6470,15 @@
                     </m:d>
                   </m:oMath>
                 </a14:m>
-                <a:endParaRPr lang="nl-NL" sz="1100" b="0"/>
+                <a:endParaRPr lang="nl-NL" sz="1100" b="0">
+                  <a:latin typeface="NimbusRomNo9L" panose="00000500000000000000" pitchFamily="50" charset="0"/>
+                </a:endParaRPr>
               </a:p>
               <a:p>
                 <a:r>
-                  <a:rPr lang="nl-NL" sz="1100"/>
+                  <a:rPr lang="nl-NL" sz="1100">
+                    <a:latin typeface="NimbusRomNo9L" panose="00000500000000000000" pitchFamily="50" charset="0"/>
+                  </a:rPr>
                   <a:t>  5)    Encrypt </a:t>
                 </a:r>
                 <a14:m>
@@ -6349,7 +6492,9 @@
                   </m:oMath>
                 </a14:m>
                 <a:r>
-                  <a:rPr lang="nl-NL" sz="1100"/>
+                  <a:rPr lang="nl-NL" sz="1100">
+                    <a:latin typeface="NimbusRomNo9L" panose="00000500000000000000" pitchFamily="50" charset="0"/>
+                  </a:rPr>
                   <a:t> </a:t>
                 </a:r>
                 <a14:m>
@@ -6424,7 +6569,7 @@
                         <m:ctrlPr>
                           <a:rPr lang="nl-NL" sz="1100" b="0" i="1" smtClean="0">
                             <a:solidFill>
-                              <a:srgbClr val="BA2824"/>
+                              <a:schemeClr val="tx1"/>
                             </a:solidFill>
                             <a:latin typeface="Cambria Math" panose="02040503050406030204" pitchFamily="18" charset="0"/>
                           </a:rPr>
@@ -6434,7 +6579,7 @@
                         <m:r>
                           <a:rPr lang="nl-NL" sz="1100" b="0" i="1" smtClean="0">
                             <a:solidFill>
-                              <a:srgbClr val="BA2824"/>
+                              <a:srgbClr val="C00000"/>
                             </a:solidFill>
                             <a:latin typeface="Cambria Math" panose="02040503050406030204" pitchFamily="18" charset="0"/>
                           </a:rPr>
@@ -6445,7 +6590,7 @@
                             <m:ctrlPr>
                               <a:rPr lang="nl-NL" sz="1100" b="0" i="1" smtClean="0">
                                 <a:solidFill>
-                                  <a:srgbClr val="BA2824"/>
+                                  <a:srgbClr val="C00000"/>
                                 </a:solidFill>
                                 <a:latin typeface="Cambria Math" panose="02040503050406030204" pitchFamily="18" charset="0"/>
                               </a:rPr>
@@ -6455,7 +6600,7 @@
                             <m:r>
                               <a:rPr lang="nl-NL" sz="1100" b="0" i="1" smtClean="0">
                                 <a:solidFill>
-                                  <a:srgbClr val="BA2824"/>
+                                  <a:srgbClr val="C00000"/>
                                 </a:solidFill>
                                 <a:latin typeface="Cambria Math" panose="02040503050406030204" pitchFamily="18" charset="0"/>
                               </a:rPr>
@@ -6466,7 +6611,7 @@
                             <m:r>
                               <a:rPr lang="nl-NL" sz="1100" b="0" i="1" smtClean="0">
                                 <a:solidFill>
-                                  <a:srgbClr val="BA2824"/>
+                                  <a:srgbClr val="C00000"/>
                                 </a:solidFill>
                                 <a:latin typeface="Cambria Math" panose="02040503050406030204" pitchFamily="18" charset="0"/>
                               </a:rPr>
@@ -6477,7 +6622,7 @@
                                 <m:ctrlPr>
                                   <a:rPr lang="nl-NL" sz="1100" b="0" i="1" smtClean="0">
                                     <a:solidFill>
-                                      <a:srgbClr val="BA2824"/>
+                                      <a:srgbClr val="C00000"/>
                                     </a:solidFill>
                                     <a:latin typeface="Cambria Math" panose="02040503050406030204" pitchFamily="18" charset="0"/>
                                   </a:rPr>
@@ -6487,7 +6632,7 @@
                                 <m:r>
                                   <a:rPr lang="nl-NL" sz="1100" b="0" i="1" smtClean="0">
                                     <a:solidFill>
-                                      <a:srgbClr val="BA2824"/>
+                                      <a:srgbClr val="C00000"/>
                                     </a:solidFill>
                                     <a:latin typeface="Cambria Math" panose="02040503050406030204" pitchFamily="18" charset="0"/>
                                   </a:rPr>
@@ -6498,7 +6643,7 @@
                                 <m:r>
                                   <a:rPr lang="nl-NL" sz="1100" b="0" i="1" smtClean="0">
                                     <a:solidFill>
-                                      <a:srgbClr val="BA2824"/>
+                                      <a:srgbClr val="C00000"/>
                                     </a:solidFill>
                                     <a:latin typeface="Cambria Math" panose="02040503050406030204" pitchFamily="18" charset="0"/>
                                   </a:rPr>
@@ -6513,7 +6658,7 @@
                             <m:ctrlPr>
                               <a:rPr lang="nl-NL" sz="1100" b="0" i="1" smtClean="0">
                                 <a:solidFill>
-                                  <a:srgbClr val="C00000"/>
+                                  <a:schemeClr val="tx1"/>
                                 </a:solidFill>
                                 <a:latin typeface="Cambria Math" panose="02040503050406030204" pitchFamily="18" charset="0"/>
                               </a:rPr>
@@ -6561,7 +6706,7 @@
                     <m:r>
                       <a:rPr lang="nl-NL" sz="1100" b="0" i="1" smtClean="0">
                         <a:solidFill>
-                          <a:srgbClr val="C00000"/>
+                          <a:schemeClr val="tx1"/>
                         </a:solidFill>
                         <a:latin typeface="Cambria Math" panose="02040503050406030204" pitchFamily="18" charset="0"/>
                       </a:rPr>
@@ -6709,7 +6854,7 @@
                         <m:r>
                           <a:rPr lang="nl-NL" sz="1100" b="0" i="1" smtClean="0">
                             <a:solidFill>
-                              <a:srgbClr val="C00000"/>
+                              <a:schemeClr val="accent1"/>
                             </a:solidFill>
                             <a:latin typeface="Cambria Math" panose="02040503050406030204" pitchFamily="18" charset="0"/>
                           </a:rPr>
@@ -6720,7 +6865,7 @@
                             <m:ctrlPr>
                               <a:rPr lang="nl-NL" sz="1100" b="0" i="1" smtClean="0">
                                 <a:solidFill>
-                                  <a:srgbClr val="C00000"/>
+                                  <a:schemeClr val="accent1"/>
                                 </a:solidFill>
                                 <a:latin typeface="Cambria Math" panose="02040503050406030204" pitchFamily="18" charset="0"/>
                               </a:rPr>
@@ -6730,7 +6875,7 @@
                             <m:r>
                               <a:rPr lang="nl-NL" sz="1100" b="0" i="1" smtClean="0">
                                 <a:solidFill>
-                                  <a:srgbClr val="C00000"/>
+                                  <a:schemeClr val="accent1"/>
                                 </a:solidFill>
                                 <a:latin typeface="Cambria Math" panose="02040503050406030204" pitchFamily="18" charset="0"/>
                               </a:rPr>
@@ -6741,7 +6886,7 @@
                             <m:r>
                               <a:rPr lang="nl-NL" sz="1100" b="0" i="1" smtClean="0">
                                 <a:solidFill>
-                                  <a:srgbClr val="C00000"/>
+                                  <a:schemeClr val="accent1"/>
                                 </a:solidFill>
                                 <a:latin typeface="Cambria Math" panose="02040503050406030204" pitchFamily="18" charset="0"/>
                               </a:rPr>
@@ -6763,7 +6908,7 @@
                     <m:r>
                       <a:rPr lang="nl-NL" sz="1100" b="0" i="1" smtClean="0">
                         <a:solidFill>
-                          <a:srgbClr val="C00000"/>
+                          <a:schemeClr val="tx1"/>
                         </a:solidFill>
                         <a:latin typeface="Cambria Math" panose="02040503050406030204" pitchFamily="18" charset="0"/>
                       </a:rPr>
@@ -6814,32 +6959,48 @@
                     </m:sSub>
                   </m:oMath>
                 </a14:m>
-                <a:endParaRPr lang="nl-NL" sz="1100" b="0"/>
+                <a:endParaRPr lang="nl-NL" sz="1100" b="0">
+                  <a:latin typeface="NimbusRomNo9L" panose="00000500000000000000" pitchFamily="50" charset="0"/>
+                </a:endParaRPr>
               </a:p>
               <a:p>
                 <a:r>
-                  <a:rPr lang="nl-NL" sz="1100"/>
+                  <a:rPr lang="nl-NL" sz="1100">
+                    <a:latin typeface="NimbusRomNo9L" panose="00000500000000000000" pitchFamily="50" charset="0"/>
+                  </a:rPr>
                   <a:t>  6)    Send to peer 1</a:t>
                 </a:r>
               </a:p>
               <a:p>
-                <a:endParaRPr lang="nl-NL" sz="1100"/>
+                <a:endParaRPr lang="nl-NL" sz="1100">
+                  <a:latin typeface="NimbusRomNo9L" panose="00000500000000000000" pitchFamily="50" charset="0"/>
+                </a:endParaRPr>
               </a:p>
               <a:p>
-                <a:endParaRPr lang="nl-NL" sz="1100"/>
+                <a:endParaRPr lang="nl-NL" sz="1100">
+                  <a:latin typeface="NimbusRomNo9L" panose="00000500000000000000" pitchFamily="50" charset="0"/>
+                </a:endParaRPr>
               </a:p>
               <a:p>
-                <a:endParaRPr lang="nl-NL" sz="1100"/>
+                <a:endParaRPr lang="nl-NL" sz="1100">
+                  <a:latin typeface="NimbusRomNo9L" panose="00000500000000000000" pitchFamily="50" charset="0"/>
+                </a:endParaRPr>
               </a:p>
               <a:p>
-                <a:endParaRPr lang="nl-NL" sz="1100"/>
+                <a:endParaRPr lang="nl-NL" sz="1100">
+                  <a:latin typeface="NimbusRomNo9L" panose="00000500000000000000" pitchFamily="50" charset="0"/>
+                </a:endParaRPr>
               </a:p>
               <a:p>
-                <a:endParaRPr lang="nl-NL" sz="1100"/>
+                <a:endParaRPr lang="nl-NL" sz="1100">
+                  <a:latin typeface="NimbusRomNo9L" panose="00000500000000000000" pitchFamily="50" charset="0"/>
+                </a:endParaRPr>
               </a:p>
               <a:p>
                 <a:r>
-                  <a:rPr lang="nl-NL" sz="1100"/>
+                  <a:rPr lang="nl-NL" sz="1100">
+                    <a:latin typeface="NimbusRomNo9L" panose="00000500000000000000" pitchFamily="50" charset="0"/>
+                  </a:rPr>
                   <a:t>  8)    Send bloom filter: </a:t>
                 </a:r>
                 <a14:m>
@@ -6941,7 +7102,7 @@
                             <m:ctrlPr>
                               <a:rPr lang="nl-NL" sz="1100" b="0" i="1" smtClean="0">
                                 <a:solidFill>
-                                  <a:schemeClr val="accent1"/>
+                                  <a:schemeClr val="tx1"/>
                                 </a:solidFill>
                                 <a:latin typeface="Cambria Math" panose="02040503050406030204" pitchFamily="18" charset="0"/>
                               </a:rPr>
@@ -6988,19 +7149,23 @@
                     </m:d>
                   </m:oMath>
                 </a14:m>
-                <a:endParaRPr lang="nl-NL" sz="1100" b="0"/>
+                <a:endParaRPr lang="nl-NL" sz="1100" b="0">
+                  <a:latin typeface="NimbusRomNo9L" panose="00000500000000000000" pitchFamily="50" charset="0"/>
+                </a:endParaRPr>
               </a:p>
               <a:p>
                 <a:pPr algn="ctr"/>
                 <a:r>
-                  <a:rPr lang="nl-NL" sz="1100" b="0"/>
+                  <a:rPr lang="nl-NL" sz="1100" b="0">
+                    <a:latin typeface="NimbusRomNo9L" panose="00000500000000000000" pitchFamily="50" charset="0"/>
+                  </a:rPr>
                   <a:t>(BF can be pre-computed)</a:t>
                 </a:r>
               </a:p>
             </p:txBody>
           </p:sp>
         </mc:Choice>
-        <mc:Fallback xmlns="">
+        <mc:Fallback>
           <p:sp>
             <p:nvSpPr>
               <p:cNvPr id="11" name="TextBox 10">
@@ -7026,7 +7191,7 @@
               <a:blipFill>
                 <a:blip r:embed="rId4"/>
                 <a:stretch>
-                  <a:fillRect b="-176"/>
+                  <a:fillRect t="-176" b="-176"/>
                 </a:stretch>
               </a:blipFill>
             </p:spPr>
@@ -7061,7 +7226,7 @@
         </p:nvCxnSpPr>
         <p:spPr>
           <a:xfrm>
-            <a:off x="3055234" y="2072640"/>
+            <a:off x="3175884" y="2072640"/>
             <a:ext cx="1870710" cy="0"/>
           </a:xfrm>
           <a:prstGeom prst="straightConnector1">
@@ -7089,8 +7254,8 @@
           </a:fontRef>
         </p:style>
       </p:cxnSp>
-      <mc:AlternateContent xmlns:mc="http://schemas.openxmlformats.org/markup-compatibility/2006" xmlns:a14="http://schemas.microsoft.com/office/drawing/2010/main">
-        <mc:Choice Requires="a14">
+      <mc:AlternateContent xmlns:mc="http://schemas.openxmlformats.org/markup-compatibility/2006">
+        <mc:Choice xmlns:a14="http://schemas.microsoft.com/office/drawing/2010/main" Requires="a14">
           <p:sp>
             <p:nvSpPr>
               <p:cNvPr id="15" name="TextBox 14">
@@ -7106,7 +7271,7 @@
             <p:spPr>
               <a:xfrm>
                 <a:off x="3169148" y="1788169"/>
-                <a:ext cx="1756796" cy="276101"/>
+                <a:ext cx="1870710" cy="276101"/>
               </a:xfrm>
               <a:prstGeom prst="rect">
                 <a:avLst/>
@@ -7208,7 +7373,7 @@
                           <m:ctrlPr>
                             <a:rPr lang="nl-NL" sz="1100" b="0" i="1" smtClean="0">
                               <a:solidFill>
-                                <a:srgbClr val="C00000"/>
+                                <a:schemeClr val="tx1"/>
                               </a:solidFill>
                               <a:latin typeface="Cambria Math" panose="02040503050406030204" pitchFamily="18" charset="0"/>
                             </a:rPr>
@@ -7259,7 +7424,7 @@
             </p:txBody>
           </p:sp>
         </mc:Choice>
-        <mc:Fallback xmlns="">
+        <mc:Fallback>
           <p:sp>
             <p:nvSpPr>
               <p:cNvPr id="15" name="TextBox 14">
@@ -7277,7 +7442,7 @@
             <p:spPr>
               <a:xfrm>
                 <a:off x="3169148" y="1788169"/>
-                <a:ext cx="1756796" cy="276101"/>
+                <a:ext cx="1870710" cy="276101"/>
               </a:xfrm>
               <a:prstGeom prst="rect">
                 <a:avLst/>
@@ -7320,7 +7485,7 @@
         </p:nvCxnSpPr>
         <p:spPr>
           <a:xfrm flipH="1">
-            <a:off x="3051424" y="2869320"/>
+            <a:off x="3172074" y="2869320"/>
             <a:ext cx="1874520" cy="0"/>
           </a:xfrm>
           <a:prstGeom prst="straightConnector1">
@@ -7348,8 +7513,8 @@
           </a:fontRef>
         </p:style>
       </p:cxnSp>
-      <mc:AlternateContent xmlns:mc="http://schemas.openxmlformats.org/markup-compatibility/2006" xmlns:a14="http://schemas.microsoft.com/office/drawing/2010/main">
-        <mc:Choice Requires="a14">
+      <mc:AlternateContent xmlns:mc="http://schemas.openxmlformats.org/markup-compatibility/2006">
+        <mc:Choice xmlns:a14="http://schemas.microsoft.com/office/drawing/2010/main" Requires="a14">
           <p:sp>
             <p:nvSpPr>
               <p:cNvPr id="19" name="TextBox 18">
@@ -7364,8 +7529,8 @@
             </p:nvSpPr>
             <p:spPr>
               <a:xfrm>
-                <a:off x="3169148" y="2519088"/>
-                <a:ext cx="1756796" cy="345672"/>
+                <a:off x="3169147" y="2519088"/>
+                <a:ext cx="1883253" cy="345672"/>
               </a:xfrm>
               <a:prstGeom prst="rect">
                 <a:avLst/>
@@ -7467,7 +7632,7 @@
                           <m:ctrlPr>
                             <a:rPr lang="nl-NL" sz="1100" b="0" i="1" smtClean="0">
                               <a:solidFill>
-                                <a:srgbClr val="C00000"/>
+                                <a:schemeClr val="tx1"/>
                               </a:solidFill>
                               <a:latin typeface="Cambria Math" panose="02040503050406030204" pitchFamily="18" charset="0"/>
                             </a:rPr>
@@ -7556,7 +7721,7 @@
                               <m:ctrlPr>
                                 <a:rPr lang="nl-NL" sz="1100" b="0" i="1" smtClean="0">
                                   <a:solidFill>
-                                    <a:srgbClr val="C00000"/>
+                                    <a:schemeClr val="tx1"/>
                                   </a:solidFill>
                                   <a:latin typeface="Cambria Math" panose="02040503050406030204" pitchFamily="18" charset="0"/>
                                 </a:rPr>
@@ -7609,7 +7774,7 @@
             </p:txBody>
           </p:sp>
         </mc:Choice>
-        <mc:Fallback xmlns="">
+        <mc:Fallback>
           <p:sp>
             <p:nvSpPr>
               <p:cNvPr id="19" name="TextBox 18">
@@ -7626,8 +7791,8 @@
             </p:nvSpPr>
             <p:spPr>
               <a:xfrm>
-                <a:off x="3169148" y="2519088"/>
-                <a:ext cx="1756796" cy="345672"/>
+                <a:off x="3169147" y="2519088"/>
+                <a:ext cx="1883253" cy="345672"/>
               </a:xfrm>
               <a:prstGeom prst="rect">
                 <a:avLst/>
@@ -7654,8 +7819,8 @@
           </p:sp>
         </mc:Fallback>
       </mc:AlternateContent>
-      <mc:AlternateContent xmlns:mc="http://schemas.openxmlformats.org/markup-compatibility/2006" xmlns:a14="http://schemas.microsoft.com/office/drawing/2010/main">
-        <mc:Choice Requires="a14">
+      <mc:AlternateContent xmlns:mc="http://schemas.openxmlformats.org/markup-compatibility/2006">
+        <mc:Choice xmlns:a14="http://schemas.microsoft.com/office/drawing/2010/main" Requires="a14">
           <p:sp>
             <p:nvSpPr>
               <p:cNvPr id="20" name="Rectangle 19">
@@ -7709,6 +7874,7 @@
                     <a:solidFill>
                       <a:schemeClr val="tx1"/>
                     </a:solidFill>
+                    <a:latin typeface="NimbusRomNo9L" panose="00000500000000000000" pitchFamily="50" charset="0"/>
                   </a:rPr>
                   <a:t>Commutative encryption</a:t>
                 </a:r>
@@ -7717,6 +7883,7 @@
                     <a:solidFill>
                       <a:schemeClr val="tx1"/>
                     </a:solidFill>
+                    <a:latin typeface="NimbusRomNo9L" panose="00000500000000000000" pitchFamily="50" charset="0"/>
                   </a:rPr>
                   <a:t>:</a:t>
                 </a:r>
@@ -7991,12 +8158,13 @@
                   <a:solidFill>
                     <a:schemeClr val="tx1"/>
                   </a:solidFill>
+                  <a:latin typeface="NimbusRomNo9L" panose="00000500000000000000" pitchFamily="50" charset="0"/>
                 </a:endParaRPr>
               </a:p>
             </p:txBody>
           </p:sp>
         </mc:Choice>
-        <mc:Fallback xmlns="">
+        <mc:Fallback>
           <p:sp>
             <p:nvSpPr>
               <p:cNvPr id="20" name="Rectangle 19">
@@ -8044,8 +8212,8 @@
           </p:sp>
         </mc:Fallback>
       </mc:AlternateContent>
-      <mc:AlternateContent xmlns:mc="http://schemas.openxmlformats.org/markup-compatibility/2006" xmlns:a14="http://schemas.microsoft.com/office/drawing/2010/main">
-        <mc:Choice Requires="a14">
+      <mc:AlternateContent xmlns:mc="http://schemas.openxmlformats.org/markup-compatibility/2006">
+        <mc:Choice xmlns:a14="http://schemas.microsoft.com/office/drawing/2010/main" Requires="a14">
           <p:sp>
             <p:nvSpPr>
               <p:cNvPr id="21" name="Rectangle 20">
@@ -8060,8 +8228,8 @@
             </p:nvSpPr>
             <p:spPr>
               <a:xfrm>
-                <a:off x="5283827" y="4307148"/>
-                <a:ext cx="2331720" cy="618882"/>
+                <a:off x="5162550" y="4307148"/>
+                <a:ext cx="2571750" cy="618882"/>
               </a:xfrm>
               <a:prstGeom prst="rect">
                 <a:avLst/>
@@ -8099,6 +8267,7 @@
                     <a:solidFill>
                       <a:schemeClr val="tx1"/>
                     </a:solidFill>
+                    <a:latin typeface="NimbusRomNo9L" panose="00000500000000000000" pitchFamily="50" charset="0"/>
                   </a:rPr>
                   <a:t>Bloom filter</a:t>
                 </a:r>
@@ -8107,6 +8276,7 @@
                     <a:solidFill>
                       <a:schemeClr val="tx1"/>
                     </a:solidFill>
+                    <a:latin typeface="NimbusRomNo9L" panose="00000500000000000000" pitchFamily="50" charset="0"/>
                   </a:rPr>
                   <a:t>:</a:t>
                 </a:r>
@@ -8118,6 +8288,7 @@
                     <a:solidFill>
                       <a:schemeClr val="tx1"/>
                     </a:solidFill>
+                    <a:latin typeface="NimbusRomNo9L" panose="00000500000000000000" pitchFamily="50" charset="0"/>
                   </a:rPr>
                   <a:t>Use </a:t>
                 </a:r>
@@ -8139,6 +8310,7 @@
                     <a:solidFill>
                       <a:schemeClr val="tx1"/>
                     </a:solidFill>
+                    <a:latin typeface="NimbusRomNo9L" panose="00000500000000000000" pitchFamily="50" charset="0"/>
                   </a:rPr>
                   <a:t> has functions on entry, save results in bit array </a:t>
                 </a:r>
@@ -8200,12 +8372,13 @@
                   <a:solidFill>
                     <a:schemeClr val="tx1"/>
                   </a:solidFill>
+                  <a:latin typeface="NimbusRomNo9L" panose="00000500000000000000" pitchFamily="50" charset="0"/>
                 </a:endParaRPr>
               </a:p>
             </p:txBody>
           </p:sp>
         </mc:Choice>
-        <mc:Fallback xmlns="">
+        <mc:Fallback>
           <p:sp>
             <p:nvSpPr>
               <p:cNvPr id="21" name="Rectangle 20">
@@ -8222,8 +8395,8 @@
             </p:nvSpPr>
             <p:spPr>
               <a:xfrm>
-                <a:off x="5283827" y="4307148"/>
-                <a:ext cx="2331720" cy="618882"/>
+                <a:off x="5162550" y="4307148"/>
+                <a:ext cx="2571750" cy="618882"/>
               </a:xfrm>
               <a:prstGeom prst="rect">
                 <a:avLst/>
@@ -8231,7 +8404,7 @@
               <a:blipFill>
                 <a:blip r:embed="rId8"/>
                 <a:stretch>
-                  <a:fillRect b="-5941"/>
+                  <a:fillRect l="-1422" r="-2370" b="-4950"/>
                 </a:stretch>
               </a:blipFill>
               <a:ln>
@@ -8269,7 +8442,7 @@
         </p:nvCxnSpPr>
         <p:spPr>
           <a:xfrm flipH="1">
-            <a:off x="3051424" y="3914995"/>
+            <a:off x="3172074" y="3914995"/>
             <a:ext cx="1874520" cy="0"/>
           </a:xfrm>
           <a:prstGeom prst="straightConnector1">
@@ -8297,8 +8470,8 @@
           </a:fontRef>
         </p:style>
       </p:cxnSp>
-      <mc:AlternateContent xmlns:mc="http://schemas.openxmlformats.org/markup-compatibility/2006" xmlns:a14="http://schemas.microsoft.com/office/drawing/2010/main">
-        <mc:Choice Requires="a14">
+      <mc:AlternateContent xmlns:mc="http://schemas.openxmlformats.org/markup-compatibility/2006">
+        <mc:Choice xmlns:a14="http://schemas.microsoft.com/office/drawing/2010/main" Requires="a14">
           <p:sp>
             <p:nvSpPr>
               <p:cNvPr id="23" name="TextBox 22">
@@ -8314,7 +8487,7 @@
             <p:spPr>
               <a:xfrm>
                 <a:off x="3169148" y="3564763"/>
-                <a:ext cx="1756796" cy="345672"/>
+                <a:ext cx="1870710" cy="345672"/>
               </a:xfrm>
               <a:prstGeom prst="rect">
                 <a:avLst/>
@@ -8431,7 +8604,7 @@
                               <m:ctrlPr>
                                 <a:rPr lang="nl-NL" sz="1100" b="0" i="1" smtClean="0">
                                   <a:solidFill>
-                                    <a:schemeClr val="accent1"/>
+                                    <a:schemeClr val="tx1"/>
                                   </a:solidFill>
                                   <a:latin typeface="Cambria Math" panose="02040503050406030204" pitchFamily="18" charset="0"/>
                                 </a:rPr>
@@ -8484,7 +8657,7 @@
             </p:txBody>
           </p:sp>
         </mc:Choice>
-        <mc:Fallback xmlns="">
+        <mc:Fallback>
           <p:sp>
             <p:nvSpPr>
               <p:cNvPr id="23" name="TextBox 22">
@@ -8502,7 +8675,7 @@
             <p:spPr>
               <a:xfrm>
                 <a:off x="3169148" y="3564763"/>
-                <a:ext cx="1756796" cy="345672"/>
+                <a:ext cx="1870710" cy="345672"/>
               </a:xfrm>
               <a:prstGeom prst="rect">
                 <a:avLst/>
@@ -8529,6 +8702,47 @@
           </p:sp>
         </mc:Fallback>
       </mc:AlternateContent>
+      <p:sp>
+        <p:nvSpPr>
+          <p:cNvPr id="18" name="TextBox 17">
+            <a:extLst>
+              <a:ext uri="{FF2B5EF4-FFF2-40B4-BE49-F238E27FC236}">
+                <a16:creationId xmlns:a16="http://schemas.microsoft.com/office/drawing/2014/main" id="{8917937D-B301-448D-9546-34B21F06F292}"/>
+              </a:ext>
+            </a:extLst>
+          </p:cNvPr>
+          <p:cNvSpPr txBox="1"/>
+          <p:nvPr/>
+        </p:nvSpPr>
+        <p:spPr>
+          <a:xfrm>
+            <a:off x="1145698" y="0"/>
+            <a:ext cx="5887404" cy="238527"/>
+          </a:xfrm>
+          <a:prstGeom prst="rect">
+            <a:avLst/>
+          </a:prstGeom>
+          <a:noFill/>
+        </p:spPr>
+        <p:txBody>
+          <a:bodyPr wrap="square">
+            <a:spAutoFit/>
+          </a:bodyPr>
+          <a:lstStyle/>
+          <a:p>
+            <a:r>
+              <a:rPr lang="en-US" sz="950">
+                <a:effectLst/>
+                <a:latin typeface="NimbusRomNo9L" panose="00000500000000000000" pitchFamily="50" charset="0"/>
+                <a:ea typeface="Calibri" panose="020F0502020204030204" pitchFamily="34" charset="0"/>
+                <a:cs typeface="Times New Roman" panose="02020603050405020304" pitchFamily="18" charset="0"/>
+              </a:rPr>
+              <a:t>These challenges/design principles are overcome/integrated in Pro-Bristle by using a mix of interrelated technologies. </a:t>
+            </a:r>
+            <a:endParaRPr lang="nl-NL" sz="950"/>
+          </a:p>
+        </p:txBody>
+      </p:sp>
     </p:spTree>
     <p:extLst>
       <p:ext uri="{BB962C8B-B14F-4D97-AF65-F5344CB8AC3E}">
@@ -16858,8 +17072,8 @@
           <a:chExt cx="0" cy="0"/>
         </a:xfrm>
       </p:grpSpPr>
-      <mc:AlternateContent xmlns:mc="http://schemas.openxmlformats.org/markup-compatibility/2006">
-        <mc:Choice xmlns:a14="http://schemas.microsoft.com/office/drawing/2010/main" Requires="a14">
+      <mc:AlternateContent xmlns:mc="http://schemas.openxmlformats.org/markup-compatibility/2006" xmlns:a14="http://schemas.microsoft.com/office/drawing/2010/main">
+        <mc:Choice Requires="a14">
           <p:graphicFrame>
             <p:nvGraphicFramePr>
               <p:cNvPr id="97" name="Table 97">
@@ -17981,7 +18195,7 @@
             </a:graphic>
           </p:graphicFrame>
         </mc:Choice>
-        <mc:Fallback>
+        <mc:Fallback xmlns="">
           <p:graphicFrame>
             <p:nvGraphicFramePr>
               <p:cNvPr id="97" name="Table 97">
@@ -18672,8 +18886,8 @@
           </p:graphicFrame>
         </mc:Fallback>
       </mc:AlternateContent>
-      <mc:AlternateContent xmlns:mc="http://schemas.openxmlformats.org/markup-compatibility/2006">
-        <mc:Choice xmlns:a14="http://schemas.microsoft.com/office/drawing/2010/main" Requires="a14">
+      <mc:AlternateContent xmlns:mc="http://schemas.openxmlformats.org/markup-compatibility/2006" xmlns:a14="http://schemas.microsoft.com/office/drawing/2010/main">
+        <mc:Choice Requires="a14">
           <p:graphicFrame>
             <p:nvGraphicFramePr>
               <p:cNvPr id="112" name="Table 97">
@@ -19798,25 +20012,7 @@
                                             <a:ea typeface="Calibri" panose="020F0502020204030204" pitchFamily="34" charset="0"/>
                                             <a:cs typeface="Times New Roman" panose="02020603050405020304" pitchFamily="18" charset="0"/>
                                           </a:rPr>
-                                          <m:t>                    </m:t>
-                                        </m:r>
-                                        <m:r>
-                                          <a:rPr lang="en-US" sz="600" b="0" i="1" smtClean="0">
-                                            <a:effectLst/>
-                                            <a:latin typeface="Cambria Math" panose="02040503050406030204" pitchFamily="18" charset="0"/>
-                                            <a:ea typeface="Calibri" panose="020F0502020204030204" pitchFamily="34" charset="0"/>
-                                            <a:cs typeface="Times New Roman" panose="02020603050405020304" pitchFamily="18" charset="0"/>
-                                          </a:rPr>
-                                          <m:t>  </m:t>
-                                        </m:r>
-                                        <m:r>
-                                          <a:rPr lang="en-US" sz="600" b="0" i="1" smtClean="0">
-                                            <a:effectLst/>
-                                            <a:latin typeface="Cambria Math" panose="02040503050406030204" pitchFamily="18" charset="0"/>
-                                            <a:ea typeface="Calibri" panose="020F0502020204030204" pitchFamily="34" charset="0"/>
-                                            <a:cs typeface="Times New Roman" panose="02020603050405020304" pitchFamily="18" charset="0"/>
-                                          </a:rPr>
-                                          <m:t>              </m:t>
+                                          <m:t>                                    </m:t>
                                         </m:r>
                                         <m:r>
                                           <a:rPr lang="en-US" sz="600" i="1">
@@ -20781,7 +20977,7 @@
             </a:graphic>
           </p:graphicFrame>
         </mc:Choice>
-        <mc:Fallback>
+        <mc:Fallback xmlns="">
           <p:graphicFrame>
             <p:nvGraphicFramePr>
               <p:cNvPr id="112" name="Table 97">
@@ -23565,8 +23761,8 @@
           </a:p>
         </p:txBody>
       </p:sp>
-      <mc:AlternateContent xmlns:mc="http://schemas.openxmlformats.org/markup-compatibility/2006">
-        <mc:Choice xmlns:a14="http://schemas.microsoft.com/office/drawing/2010/main" Requires="a14">
+      <mc:AlternateContent xmlns:mc="http://schemas.openxmlformats.org/markup-compatibility/2006" xmlns:a14="http://schemas.microsoft.com/office/drawing/2010/main">
+        <mc:Choice Requires="a14">
           <p:graphicFrame>
             <p:nvGraphicFramePr>
               <p:cNvPr id="117" name="Table 97">
@@ -24444,7 +24640,7 @@
             </a:graphic>
           </p:graphicFrame>
         </mc:Choice>
-        <mc:Fallback>
+        <mc:Fallback xmlns="">
           <p:graphicFrame>
             <p:nvGraphicFramePr>
               <p:cNvPr id="117" name="Table 97">
@@ -32733,8 +32929,8 @@
           </a:prstGeom>
         </p:spPr>
       </p:pic>
-      <mc:AlternateContent xmlns:mc="http://schemas.openxmlformats.org/markup-compatibility/2006">
-        <mc:Choice xmlns:a14="http://schemas.microsoft.com/office/drawing/2010/main" Requires="a14">
+      <mc:AlternateContent xmlns:mc="http://schemas.openxmlformats.org/markup-compatibility/2006" xmlns:a14="http://schemas.microsoft.com/office/drawing/2010/main">
+        <mc:Choice Requires="a14">
           <p:sp>
             <p:nvSpPr>
               <p:cNvPr id="66" name="Rectangle 65">
@@ -32836,7 +33032,7 @@
             </p:txBody>
           </p:sp>
         </mc:Choice>
-        <mc:Fallback>
+        <mc:Fallback xmlns="">
           <p:sp>
             <p:nvSpPr>
               <p:cNvPr id="66" name="Rectangle 65">
@@ -42230,6 +42426,2210 @@
 </p:sld>
 </file>
 
+<file path=ppt/slides/slide8.xml><?xml version="1.0" encoding="utf-8"?>
+<p:sld xmlns:a="http://schemas.openxmlformats.org/drawingml/2006/main" xmlns:r="http://schemas.openxmlformats.org/officeDocument/2006/relationships" xmlns:p="http://schemas.openxmlformats.org/presentationml/2006/main">
+  <p:cSld>
+    <p:spTree>
+      <p:nvGrpSpPr>
+        <p:cNvPr id="1" name=""/>
+        <p:cNvGrpSpPr/>
+        <p:nvPr/>
+      </p:nvGrpSpPr>
+      <p:grpSpPr>
+        <a:xfrm>
+          <a:off x="0" y="0"/>
+          <a:ext cx="0" cy="0"/>
+          <a:chOff x="0" y="0"/>
+          <a:chExt cx="0" cy="0"/>
+        </a:xfrm>
+      </p:grpSpPr>
+      <p:sp>
+        <p:nvSpPr>
+          <p:cNvPr id="5" name="Oval 4">
+            <a:extLst>
+              <a:ext uri="{FF2B5EF4-FFF2-40B4-BE49-F238E27FC236}">
+                <a16:creationId xmlns:a16="http://schemas.microsoft.com/office/drawing/2014/main" id="{44D25CE1-FD89-4A47-A540-9F33670F45B0}"/>
+              </a:ext>
+            </a:extLst>
+          </p:cNvPr>
+          <p:cNvSpPr/>
+          <p:nvPr/>
+        </p:nvSpPr>
+        <p:spPr>
+          <a:xfrm rot="2700107">
+            <a:off x="2137999" y="3663534"/>
+            <a:ext cx="2397385" cy="1145944"/>
+          </a:xfrm>
+          <a:prstGeom prst="ellipse">
+            <a:avLst/>
+          </a:prstGeom>
+          <a:solidFill>
+            <a:srgbClr val="F5DB7D">
+              <a:alpha val="50000"/>
+            </a:srgbClr>
+          </a:solidFill>
+          <a:ln>
+            <a:solidFill>
+              <a:srgbClr val="C4A02E"/>
+            </a:solidFill>
+          </a:ln>
+        </p:spPr>
+        <p:style>
+          <a:lnRef idx="2">
+            <a:schemeClr val="accent1">
+              <a:shade val="50000"/>
+            </a:schemeClr>
+          </a:lnRef>
+          <a:fillRef idx="1">
+            <a:schemeClr val="accent1"/>
+          </a:fillRef>
+          <a:effectRef idx="0">
+            <a:schemeClr val="accent1"/>
+          </a:effectRef>
+          <a:fontRef idx="minor">
+            <a:schemeClr val="lt1"/>
+          </a:fontRef>
+        </p:style>
+        <p:txBody>
+          <a:bodyPr rot="0" spcFirstLastPara="0" vert="horz" wrap="square" lIns="91440" tIns="45720" rIns="91440" bIns="45720" numCol="1" spcCol="0" rtlCol="0" fromWordArt="0" anchor="ctr" anchorCtr="0" forceAA="0" compatLnSpc="1">
+            <a:prstTxWarp prst="textNoShape">
+              <a:avLst/>
+            </a:prstTxWarp>
+            <a:noAutofit/>
+          </a:bodyPr>
+          <a:lstStyle/>
+          <a:p>
+            <a:endParaRPr lang="nl-NL"/>
+          </a:p>
+        </p:txBody>
+      </p:sp>
+      <p:sp>
+        <p:nvSpPr>
+          <p:cNvPr id="6" name="Oval 5">
+            <a:extLst>
+              <a:ext uri="{FF2B5EF4-FFF2-40B4-BE49-F238E27FC236}">
+                <a16:creationId xmlns:a16="http://schemas.microsoft.com/office/drawing/2014/main" id="{30171374-70D8-4C39-A7A0-8399C4139B99}"/>
+              </a:ext>
+            </a:extLst>
+          </p:cNvPr>
+          <p:cNvSpPr/>
+          <p:nvPr/>
+        </p:nvSpPr>
+        <p:spPr>
+          <a:xfrm rot="2700107">
+            <a:off x="2654599" y="3393760"/>
+            <a:ext cx="2236423" cy="1024204"/>
+          </a:xfrm>
+          <a:prstGeom prst="ellipse">
+            <a:avLst/>
+          </a:prstGeom>
+          <a:solidFill>
+            <a:srgbClr val="A2E0D1">
+              <a:alpha val="50000"/>
+            </a:srgbClr>
+          </a:solidFill>
+          <a:ln>
+            <a:solidFill>
+              <a:srgbClr val="5ACA8D"/>
+            </a:solidFill>
+          </a:ln>
+        </p:spPr>
+        <p:style>
+          <a:lnRef idx="2">
+            <a:schemeClr val="accent1">
+              <a:shade val="50000"/>
+            </a:schemeClr>
+          </a:lnRef>
+          <a:fillRef idx="1">
+            <a:schemeClr val="accent1"/>
+          </a:fillRef>
+          <a:effectRef idx="0">
+            <a:schemeClr val="accent1"/>
+          </a:effectRef>
+          <a:fontRef idx="minor">
+            <a:schemeClr val="lt1"/>
+          </a:fontRef>
+        </p:style>
+        <p:txBody>
+          <a:bodyPr rot="0" spcFirstLastPara="0" vert="horz" wrap="square" lIns="91440" tIns="45720" rIns="91440" bIns="45720" numCol="1" spcCol="0" rtlCol="0" fromWordArt="0" anchor="ctr" anchorCtr="0" forceAA="0" compatLnSpc="1">
+            <a:prstTxWarp prst="textNoShape">
+              <a:avLst/>
+            </a:prstTxWarp>
+            <a:noAutofit/>
+          </a:bodyPr>
+          <a:lstStyle/>
+          <a:p>
+            <a:endParaRPr lang="nl-NL"/>
+          </a:p>
+        </p:txBody>
+      </p:sp>
+      <p:sp>
+        <p:nvSpPr>
+          <p:cNvPr id="7" name="Oval 6">
+            <a:extLst>
+              <a:ext uri="{FF2B5EF4-FFF2-40B4-BE49-F238E27FC236}">
+                <a16:creationId xmlns:a16="http://schemas.microsoft.com/office/drawing/2014/main" id="{67636314-E021-4984-8343-3B67A846272D}"/>
+              </a:ext>
+            </a:extLst>
+          </p:cNvPr>
+          <p:cNvSpPr/>
+          <p:nvPr/>
+        </p:nvSpPr>
+        <p:spPr>
+          <a:xfrm rot="18899893" flipH="1">
+            <a:off x="3344897" y="3670285"/>
+            <a:ext cx="2397385" cy="1145944"/>
+          </a:xfrm>
+          <a:prstGeom prst="ellipse">
+            <a:avLst/>
+          </a:prstGeom>
+          <a:solidFill>
+            <a:srgbClr val="95C3E7">
+              <a:alpha val="50000"/>
+            </a:srgbClr>
+          </a:solidFill>
+          <a:ln>
+            <a:solidFill>
+              <a:srgbClr val="4F909F"/>
+            </a:solidFill>
+          </a:ln>
+        </p:spPr>
+        <p:style>
+          <a:lnRef idx="2">
+            <a:schemeClr val="accent1">
+              <a:shade val="50000"/>
+            </a:schemeClr>
+          </a:lnRef>
+          <a:fillRef idx="1">
+            <a:schemeClr val="accent1"/>
+          </a:fillRef>
+          <a:effectRef idx="0">
+            <a:schemeClr val="accent1"/>
+          </a:effectRef>
+          <a:fontRef idx="minor">
+            <a:schemeClr val="lt1"/>
+          </a:fontRef>
+        </p:style>
+        <p:txBody>
+          <a:bodyPr rot="0" spcFirstLastPara="0" vert="horz" wrap="square" lIns="91440" tIns="45720" rIns="91440" bIns="45720" numCol="1" spcCol="0" rtlCol="0" fromWordArt="0" anchor="ctr" anchorCtr="0" forceAA="0" compatLnSpc="1">
+            <a:prstTxWarp prst="textNoShape">
+              <a:avLst/>
+            </a:prstTxWarp>
+            <a:noAutofit/>
+          </a:bodyPr>
+          <a:lstStyle/>
+          <a:p>
+            <a:endParaRPr lang="nl-NL"/>
+          </a:p>
+        </p:txBody>
+      </p:sp>
+      <p:sp>
+        <p:nvSpPr>
+          <p:cNvPr id="8" name="Oval 7">
+            <a:extLst>
+              <a:ext uri="{FF2B5EF4-FFF2-40B4-BE49-F238E27FC236}">
+                <a16:creationId xmlns:a16="http://schemas.microsoft.com/office/drawing/2014/main" id="{E0C69C74-2BB8-4AB9-B809-EF81BE31705C}"/>
+              </a:ext>
+            </a:extLst>
+          </p:cNvPr>
+          <p:cNvSpPr/>
+          <p:nvPr/>
+        </p:nvSpPr>
+        <p:spPr>
+          <a:xfrm rot="18899893" flipH="1">
+            <a:off x="2990948" y="3407261"/>
+            <a:ext cx="2236423" cy="1024204"/>
+          </a:xfrm>
+          <a:prstGeom prst="ellipse">
+            <a:avLst/>
+          </a:prstGeom>
+          <a:solidFill>
+            <a:srgbClr val="E59997">
+              <a:alpha val="50000"/>
+            </a:srgbClr>
+          </a:solidFill>
+          <a:ln>
+            <a:solidFill>
+              <a:srgbClr val="D45C60"/>
+            </a:solidFill>
+          </a:ln>
+        </p:spPr>
+        <p:style>
+          <a:lnRef idx="2">
+            <a:schemeClr val="accent1">
+              <a:shade val="50000"/>
+            </a:schemeClr>
+          </a:lnRef>
+          <a:fillRef idx="1">
+            <a:schemeClr val="accent1"/>
+          </a:fillRef>
+          <a:effectRef idx="0">
+            <a:schemeClr val="accent1"/>
+          </a:effectRef>
+          <a:fontRef idx="minor">
+            <a:schemeClr val="lt1"/>
+          </a:fontRef>
+        </p:style>
+        <p:txBody>
+          <a:bodyPr rot="0" spcFirstLastPara="0" vert="horz" wrap="square" lIns="91440" tIns="45720" rIns="91440" bIns="45720" numCol="1" spcCol="0" rtlCol="0" fromWordArt="0" anchor="ctr" anchorCtr="0" forceAA="0" compatLnSpc="1">
+            <a:prstTxWarp prst="textNoShape">
+              <a:avLst/>
+            </a:prstTxWarp>
+            <a:noAutofit/>
+          </a:bodyPr>
+          <a:lstStyle/>
+          <a:p>
+            <a:endParaRPr lang="nl-NL"/>
+          </a:p>
+        </p:txBody>
+      </p:sp>
+      <p:sp>
+        <p:nvSpPr>
+          <p:cNvPr id="9" name="Oval 8">
+            <a:extLst>
+              <a:ext uri="{FF2B5EF4-FFF2-40B4-BE49-F238E27FC236}">
+                <a16:creationId xmlns:a16="http://schemas.microsoft.com/office/drawing/2014/main" id="{24791870-C30F-455C-A55C-1DDA5E2749D0}"/>
+              </a:ext>
+            </a:extLst>
+          </p:cNvPr>
+          <p:cNvSpPr/>
+          <p:nvPr/>
+        </p:nvSpPr>
+        <p:spPr>
+          <a:xfrm>
+            <a:off x="2593975" y="3807646"/>
+            <a:ext cx="59356" cy="60756"/>
+          </a:xfrm>
+          <a:prstGeom prst="ellipse">
+            <a:avLst/>
+          </a:prstGeom>
+          <a:solidFill>
+            <a:srgbClr val="FFC000"/>
+          </a:solidFill>
+          <a:ln w="9525">
+            <a:solidFill>
+              <a:schemeClr val="tx1">
+                <a:lumMod val="75000"/>
+                <a:lumOff val="25000"/>
+              </a:schemeClr>
+            </a:solidFill>
+          </a:ln>
+        </p:spPr>
+        <p:style>
+          <a:lnRef idx="2">
+            <a:schemeClr val="accent1">
+              <a:shade val="50000"/>
+            </a:schemeClr>
+          </a:lnRef>
+          <a:fillRef idx="1">
+            <a:schemeClr val="accent1"/>
+          </a:fillRef>
+          <a:effectRef idx="0">
+            <a:schemeClr val="accent1"/>
+          </a:effectRef>
+          <a:fontRef idx="minor">
+            <a:schemeClr val="lt1"/>
+          </a:fontRef>
+        </p:style>
+        <p:txBody>
+          <a:bodyPr rot="0" spcFirstLastPara="0" vert="horz" wrap="square" lIns="91440" tIns="45720" rIns="91440" bIns="45720" numCol="1" spcCol="0" rtlCol="0" fromWordArt="0" anchor="ctr" anchorCtr="0" forceAA="0" compatLnSpc="1">
+            <a:prstTxWarp prst="textNoShape">
+              <a:avLst/>
+            </a:prstTxWarp>
+            <a:noAutofit/>
+          </a:bodyPr>
+          <a:lstStyle/>
+          <a:p>
+            <a:endParaRPr lang="nl-NL"/>
+          </a:p>
+        </p:txBody>
+      </p:sp>
+      <p:sp>
+        <p:nvSpPr>
+          <p:cNvPr id="10" name="Text Box 32">
+            <a:extLst>
+              <a:ext uri="{FF2B5EF4-FFF2-40B4-BE49-F238E27FC236}">
+                <a16:creationId xmlns:a16="http://schemas.microsoft.com/office/drawing/2014/main" id="{61D8F2DF-7996-4A03-AF64-1A71254003DC}"/>
+              </a:ext>
+            </a:extLst>
+          </p:cNvPr>
+          <p:cNvSpPr txBox="1"/>
+          <p:nvPr/>
+        </p:nvSpPr>
+        <p:spPr>
+          <a:xfrm>
+            <a:off x="2706091" y="3773892"/>
+            <a:ext cx="300621" cy="124405"/>
+          </a:xfrm>
+          <a:prstGeom prst="rect">
+            <a:avLst/>
+          </a:prstGeom>
+          <a:noFill/>
+          <a:ln w="6350">
+            <a:noFill/>
+          </a:ln>
+        </p:spPr>
+        <p:txBody>
+          <a:bodyPr rot="0" spcFirstLastPara="0" vert="horz" wrap="square" lIns="0" tIns="0" rIns="0" bIns="0" numCol="1" spcCol="0" rtlCol="0" fromWordArt="0" anchor="t" anchorCtr="0" forceAA="0" compatLnSpc="1">
+            <a:prstTxWarp prst="textNoShape">
+              <a:avLst/>
+            </a:prstTxWarp>
+            <a:noAutofit/>
+          </a:bodyPr>
+          <a:lstStyle/>
+          <a:p>
+            <a:pPr marL="0" marR="0" algn="just">
+              <a:spcBef>
+                <a:spcPts val="0"/>
+              </a:spcBef>
+              <a:spcAft>
+                <a:spcPts val="500"/>
+              </a:spcAft>
+            </a:pPr>
+            <a:r>
+              <a:rPr lang="en-US" sz="950" b="1">
+                <a:effectLst/>
+                <a:latin typeface="Proxima Nova Lt" panose="02000506030000020004" pitchFamily="50" charset="0"/>
+                <a:ea typeface="Calibri" panose="020F0502020204030204" pitchFamily="34" charset="0"/>
+                <a:cs typeface="Times New Roman" panose="02020603050405020304" pitchFamily="18" charset="0"/>
+              </a:rPr>
+              <a:t>EWC</a:t>
+            </a:r>
+            <a:endParaRPr lang="nl-NL" sz="950">
+              <a:effectLst/>
+              <a:latin typeface="NimbusRomNo9L" panose="00000500000000000000" pitchFamily="50" charset="0"/>
+              <a:ea typeface="Calibri" panose="020F0502020204030204" pitchFamily="34" charset="0"/>
+              <a:cs typeface="Times New Roman" panose="02020603050405020304" pitchFamily="18" charset="0"/>
+            </a:endParaRPr>
+          </a:p>
+        </p:txBody>
+      </p:sp>
+      <p:sp>
+        <p:nvSpPr>
+          <p:cNvPr id="11" name="Oval 10">
+            <a:extLst>
+              <a:ext uri="{FF2B5EF4-FFF2-40B4-BE49-F238E27FC236}">
+                <a16:creationId xmlns:a16="http://schemas.microsoft.com/office/drawing/2014/main" id="{B3E76AE6-245C-43DC-B427-15E9DA2BACAA}"/>
+              </a:ext>
+            </a:extLst>
+          </p:cNvPr>
+          <p:cNvSpPr/>
+          <p:nvPr/>
+        </p:nvSpPr>
+        <p:spPr>
+          <a:xfrm>
+            <a:off x="2653331" y="3996664"/>
+            <a:ext cx="59356" cy="60756"/>
+          </a:xfrm>
+          <a:prstGeom prst="ellipse">
+            <a:avLst/>
+          </a:prstGeom>
+          <a:solidFill>
+            <a:srgbClr val="FFC000"/>
+          </a:solidFill>
+          <a:ln w="9525">
+            <a:solidFill>
+              <a:schemeClr val="tx1">
+                <a:lumMod val="75000"/>
+                <a:lumOff val="25000"/>
+              </a:schemeClr>
+            </a:solidFill>
+          </a:ln>
+        </p:spPr>
+        <p:style>
+          <a:lnRef idx="2">
+            <a:schemeClr val="accent1">
+              <a:shade val="50000"/>
+            </a:schemeClr>
+          </a:lnRef>
+          <a:fillRef idx="1">
+            <a:schemeClr val="accent1"/>
+          </a:fillRef>
+          <a:effectRef idx="0">
+            <a:schemeClr val="accent1"/>
+          </a:effectRef>
+          <a:fontRef idx="minor">
+            <a:schemeClr val="lt1"/>
+          </a:fontRef>
+        </p:style>
+        <p:txBody>
+          <a:bodyPr rot="0" spcFirstLastPara="0" vert="horz" wrap="square" lIns="91440" tIns="45720" rIns="91440" bIns="45720" numCol="1" spcCol="0" rtlCol="0" fromWordArt="0" anchor="ctr" anchorCtr="0" forceAA="0" compatLnSpc="1">
+            <a:prstTxWarp prst="textNoShape">
+              <a:avLst/>
+            </a:prstTxWarp>
+            <a:noAutofit/>
+          </a:bodyPr>
+          <a:lstStyle/>
+          <a:p>
+            <a:endParaRPr lang="nl-NL"/>
+          </a:p>
+        </p:txBody>
+      </p:sp>
+      <p:sp>
+        <p:nvSpPr>
+          <p:cNvPr id="12" name="Text Box 34">
+            <a:extLst>
+              <a:ext uri="{FF2B5EF4-FFF2-40B4-BE49-F238E27FC236}">
+                <a16:creationId xmlns:a16="http://schemas.microsoft.com/office/drawing/2014/main" id="{7A4C5044-6D72-48B1-806A-1B889DD54557}"/>
+              </a:ext>
+            </a:extLst>
+          </p:cNvPr>
+          <p:cNvSpPr txBox="1"/>
+          <p:nvPr/>
+        </p:nvSpPr>
+        <p:spPr>
+          <a:xfrm>
+            <a:off x="2772042" y="3962911"/>
+            <a:ext cx="300621" cy="124405"/>
+          </a:xfrm>
+          <a:prstGeom prst="rect">
+            <a:avLst/>
+          </a:prstGeom>
+          <a:noFill/>
+          <a:ln w="6350">
+            <a:noFill/>
+          </a:ln>
+        </p:spPr>
+        <p:txBody>
+          <a:bodyPr rot="0" spcFirstLastPara="0" vert="horz" wrap="square" lIns="0" tIns="0" rIns="0" bIns="0" numCol="1" spcCol="0" rtlCol="0" fromWordArt="0" anchor="t" anchorCtr="0" forceAA="0" compatLnSpc="1">
+            <a:prstTxWarp prst="textNoShape">
+              <a:avLst/>
+            </a:prstTxWarp>
+            <a:noAutofit/>
+          </a:bodyPr>
+          <a:lstStyle/>
+          <a:p>
+            <a:pPr marL="0" marR="0" algn="just">
+              <a:spcBef>
+                <a:spcPts val="0"/>
+              </a:spcBef>
+              <a:spcAft>
+                <a:spcPts val="500"/>
+              </a:spcAft>
+            </a:pPr>
+            <a:r>
+              <a:rPr lang="en-US" sz="950" b="1">
+                <a:effectLst/>
+                <a:latin typeface="Proxima Nova Lt" panose="02000506030000020004" pitchFamily="50" charset="0"/>
+                <a:ea typeface="Calibri" panose="020F0502020204030204" pitchFamily="34" charset="0"/>
+                <a:cs typeface="Times New Roman" panose="02020603050405020304" pitchFamily="18" charset="0"/>
+              </a:rPr>
+              <a:t>SI</a:t>
+            </a:r>
+            <a:endParaRPr lang="nl-NL" sz="950">
+              <a:effectLst/>
+              <a:latin typeface="NimbusRomNo9L" panose="00000500000000000000" pitchFamily="50" charset="0"/>
+              <a:ea typeface="Calibri" panose="020F0502020204030204" pitchFamily="34" charset="0"/>
+              <a:cs typeface="Times New Roman" panose="02020603050405020304" pitchFamily="18" charset="0"/>
+            </a:endParaRPr>
+          </a:p>
+        </p:txBody>
+      </p:sp>
+      <p:sp>
+        <p:nvSpPr>
+          <p:cNvPr id="13" name="Oval 12">
+            <a:extLst>
+              <a:ext uri="{FF2B5EF4-FFF2-40B4-BE49-F238E27FC236}">
+                <a16:creationId xmlns:a16="http://schemas.microsoft.com/office/drawing/2014/main" id="{47A9E935-A9BA-4FEC-A7E5-AED83EE1E1C6}"/>
+              </a:ext>
+            </a:extLst>
+          </p:cNvPr>
+          <p:cNvSpPr/>
+          <p:nvPr/>
+        </p:nvSpPr>
+        <p:spPr>
+          <a:xfrm>
+            <a:off x="2739067" y="4178932"/>
+            <a:ext cx="59356" cy="60756"/>
+          </a:xfrm>
+          <a:prstGeom prst="ellipse">
+            <a:avLst/>
+          </a:prstGeom>
+          <a:solidFill>
+            <a:srgbClr val="FFC000"/>
+          </a:solidFill>
+          <a:ln w="9525">
+            <a:solidFill>
+              <a:schemeClr val="tx1">
+                <a:lumMod val="75000"/>
+                <a:lumOff val="25000"/>
+              </a:schemeClr>
+            </a:solidFill>
+          </a:ln>
+        </p:spPr>
+        <p:style>
+          <a:lnRef idx="2">
+            <a:schemeClr val="accent1">
+              <a:shade val="50000"/>
+            </a:schemeClr>
+          </a:lnRef>
+          <a:fillRef idx="1">
+            <a:schemeClr val="accent1"/>
+          </a:fillRef>
+          <a:effectRef idx="0">
+            <a:schemeClr val="accent1"/>
+          </a:effectRef>
+          <a:fontRef idx="minor">
+            <a:schemeClr val="lt1"/>
+          </a:fontRef>
+        </p:style>
+        <p:txBody>
+          <a:bodyPr rot="0" spcFirstLastPara="0" vert="horz" wrap="square" lIns="91440" tIns="45720" rIns="91440" bIns="45720" numCol="1" spcCol="0" rtlCol="0" fromWordArt="0" anchor="ctr" anchorCtr="0" forceAA="0" compatLnSpc="1">
+            <a:prstTxWarp prst="textNoShape">
+              <a:avLst/>
+            </a:prstTxWarp>
+            <a:noAutofit/>
+          </a:bodyPr>
+          <a:lstStyle/>
+          <a:p>
+            <a:endParaRPr lang="nl-NL"/>
+          </a:p>
+        </p:txBody>
+      </p:sp>
+      <p:sp>
+        <p:nvSpPr>
+          <p:cNvPr id="14" name="Text Box 36">
+            <a:extLst>
+              <a:ext uri="{FF2B5EF4-FFF2-40B4-BE49-F238E27FC236}">
+                <a16:creationId xmlns:a16="http://schemas.microsoft.com/office/drawing/2014/main" id="{C27A255E-6A22-4976-9A20-B4F6A784C9B6}"/>
+              </a:ext>
+            </a:extLst>
+          </p:cNvPr>
+          <p:cNvSpPr txBox="1"/>
+          <p:nvPr/>
+        </p:nvSpPr>
+        <p:spPr>
+          <a:xfrm>
+            <a:off x="2851183" y="4145178"/>
+            <a:ext cx="300076" cy="124212"/>
+          </a:xfrm>
+          <a:prstGeom prst="rect">
+            <a:avLst/>
+          </a:prstGeom>
+          <a:noFill/>
+          <a:ln w="6350">
+            <a:noFill/>
+          </a:ln>
+        </p:spPr>
+        <p:txBody>
+          <a:bodyPr rot="0" spcFirstLastPara="0" vert="horz" wrap="square" lIns="0" tIns="0" rIns="0" bIns="0" numCol="1" spcCol="0" rtlCol="0" fromWordArt="0" anchor="t" anchorCtr="0" forceAA="0" compatLnSpc="1">
+            <a:prstTxWarp prst="textNoShape">
+              <a:avLst/>
+            </a:prstTxWarp>
+            <a:noAutofit/>
+          </a:bodyPr>
+          <a:lstStyle/>
+          <a:p>
+            <a:pPr marL="0" marR="0" algn="just">
+              <a:spcBef>
+                <a:spcPts val="0"/>
+              </a:spcBef>
+              <a:spcAft>
+                <a:spcPts val="500"/>
+              </a:spcAft>
+            </a:pPr>
+            <a:r>
+              <a:rPr lang="en-US" sz="950" b="1">
+                <a:effectLst/>
+                <a:latin typeface="Proxima Nova Lt" panose="02000506030000020004" pitchFamily="50" charset="0"/>
+                <a:ea typeface="Calibri" panose="020F0502020204030204" pitchFamily="34" charset="0"/>
+                <a:cs typeface="Times New Roman" panose="02020603050405020304" pitchFamily="18" charset="0"/>
+              </a:rPr>
+              <a:t>LWF</a:t>
+            </a:r>
+            <a:endParaRPr lang="nl-NL" sz="950">
+              <a:effectLst/>
+              <a:latin typeface="NimbusRomNo9L" panose="00000500000000000000" pitchFamily="50" charset="0"/>
+              <a:ea typeface="Calibri" panose="020F0502020204030204" pitchFamily="34" charset="0"/>
+              <a:cs typeface="Times New Roman" panose="02020603050405020304" pitchFamily="18" charset="0"/>
+            </a:endParaRPr>
+          </a:p>
+        </p:txBody>
+      </p:sp>
+      <p:sp>
+        <p:nvSpPr>
+          <p:cNvPr id="15" name="Oval 14">
+            <a:extLst>
+              <a:ext uri="{FF2B5EF4-FFF2-40B4-BE49-F238E27FC236}">
+                <a16:creationId xmlns:a16="http://schemas.microsoft.com/office/drawing/2014/main" id="{9477A63B-8EA4-44E6-B9D3-AD0A85AAD727}"/>
+              </a:ext>
+            </a:extLst>
+          </p:cNvPr>
+          <p:cNvSpPr/>
+          <p:nvPr/>
+        </p:nvSpPr>
+        <p:spPr>
+          <a:xfrm>
+            <a:off x="3062225" y="3193336"/>
+            <a:ext cx="59356" cy="60756"/>
+          </a:xfrm>
+          <a:prstGeom prst="ellipse">
+            <a:avLst/>
+          </a:prstGeom>
+          <a:solidFill>
+            <a:srgbClr val="5ACA8D"/>
+          </a:solidFill>
+          <a:ln w="9525">
+            <a:solidFill>
+              <a:schemeClr val="tx1">
+                <a:lumMod val="75000"/>
+                <a:lumOff val="25000"/>
+              </a:schemeClr>
+            </a:solidFill>
+          </a:ln>
+        </p:spPr>
+        <p:style>
+          <a:lnRef idx="2">
+            <a:schemeClr val="accent1">
+              <a:shade val="50000"/>
+            </a:schemeClr>
+          </a:lnRef>
+          <a:fillRef idx="1">
+            <a:schemeClr val="accent1"/>
+          </a:fillRef>
+          <a:effectRef idx="0">
+            <a:schemeClr val="accent1"/>
+          </a:effectRef>
+          <a:fontRef idx="minor">
+            <a:schemeClr val="lt1"/>
+          </a:fontRef>
+        </p:style>
+        <p:txBody>
+          <a:bodyPr rot="0" spcFirstLastPara="0" vert="horz" wrap="square" lIns="91440" tIns="45720" rIns="91440" bIns="45720" numCol="1" spcCol="0" rtlCol="0" fromWordArt="0" anchor="ctr" anchorCtr="0" forceAA="0" compatLnSpc="1">
+            <a:prstTxWarp prst="textNoShape">
+              <a:avLst/>
+            </a:prstTxWarp>
+            <a:noAutofit/>
+          </a:bodyPr>
+          <a:lstStyle/>
+          <a:p>
+            <a:endParaRPr lang="nl-NL"/>
+          </a:p>
+        </p:txBody>
+      </p:sp>
+      <p:sp>
+        <p:nvSpPr>
+          <p:cNvPr id="16" name="Text Box 38">
+            <a:extLst>
+              <a:ext uri="{FF2B5EF4-FFF2-40B4-BE49-F238E27FC236}">
+                <a16:creationId xmlns:a16="http://schemas.microsoft.com/office/drawing/2014/main" id="{601E8186-378B-4CA9-9C9E-432509A42405}"/>
+              </a:ext>
+            </a:extLst>
+          </p:cNvPr>
+          <p:cNvSpPr txBox="1"/>
+          <p:nvPr/>
+        </p:nvSpPr>
+        <p:spPr>
+          <a:xfrm>
+            <a:off x="2930324" y="2842302"/>
+            <a:ext cx="603849" cy="259900"/>
+          </a:xfrm>
+          <a:prstGeom prst="rect">
+            <a:avLst/>
+          </a:prstGeom>
+          <a:noFill/>
+          <a:ln w="6350">
+            <a:noFill/>
+          </a:ln>
+        </p:spPr>
+        <p:txBody>
+          <a:bodyPr rot="0" spcFirstLastPara="0" vert="horz" wrap="square" lIns="0" tIns="0" rIns="0" bIns="0" numCol="1" spcCol="0" rtlCol="0" fromWordArt="0" anchor="t" anchorCtr="0" forceAA="0" compatLnSpc="1">
+            <a:prstTxWarp prst="textNoShape">
+              <a:avLst/>
+            </a:prstTxWarp>
+            <a:noAutofit/>
+          </a:bodyPr>
+          <a:lstStyle/>
+          <a:p>
+            <a:pPr marL="0" marR="0" algn="just">
+              <a:spcBef>
+                <a:spcPts val="0"/>
+              </a:spcBef>
+              <a:spcAft>
+                <a:spcPts val="500"/>
+              </a:spcAft>
+            </a:pPr>
+            <a:r>
+              <a:rPr lang="en-US" sz="950" b="1">
+                <a:effectLst/>
+                <a:latin typeface="Proxima Nova Lt" panose="02000506030000020004" pitchFamily="50" charset="0"/>
+                <a:ea typeface="Calibri" panose="020F0502020204030204" pitchFamily="34" charset="0"/>
+                <a:cs typeface="Times New Roman" panose="02020603050405020304" pitchFamily="18" charset="0"/>
+              </a:rPr>
+              <a:t>Rehearsal</a:t>
+            </a:r>
+            <a:endParaRPr lang="nl-NL" sz="950">
+              <a:effectLst/>
+              <a:latin typeface="NimbusRomNo9L" panose="00000500000000000000" pitchFamily="50" charset="0"/>
+              <a:ea typeface="Calibri" panose="020F0502020204030204" pitchFamily="34" charset="0"/>
+              <a:cs typeface="Times New Roman" panose="02020603050405020304" pitchFamily="18" charset="0"/>
+            </a:endParaRPr>
+          </a:p>
+        </p:txBody>
+      </p:sp>
+      <p:sp>
+        <p:nvSpPr>
+          <p:cNvPr id="17" name="Oval 16">
+            <a:extLst>
+              <a:ext uri="{FF2B5EF4-FFF2-40B4-BE49-F238E27FC236}">
+                <a16:creationId xmlns:a16="http://schemas.microsoft.com/office/drawing/2014/main" id="{BA7AC0C9-4A3B-4D16-A61C-83B95505F592}"/>
+              </a:ext>
+            </a:extLst>
+          </p:cNvPr>
+          <p:cNvSpPr/>
+          <p:nvPr/>
+        </p:nvSpPr>
+        <p:spPr>
+          <a:xfrm>
+            <a:off x="3502091" y="3443110"/>
+            <a:ext cx="59356" cy="60756"/>
+          </a:xfrm>
+          <a:prstGeom prst="ellipse">
+            <a:avLst/>
+          </a:prstGeom>
+          <a:solidFill>
+            <a:srgbClr val="5ACA8D"/>
+          </a:solidFill>
+          <a:ln w="9525">
+            <a:solidFill>
+              <a:schemeClr val="tx1">
+                <a:lumMod val="75000"/>
+                <a:lumOff val="25000"/>
+              </a:schemeClr>
+            </a:solidFill>
+          </a:ln>
+        </p:spPr>
+        <p:style>
+          <a:lnRef idx="2">
+            <a:schemeClr val="accent1">
+              <a:shade val="50000"/>
+            </a:schemeClr>
+          </a:lnRef>
+          <a:fillRef idx="1">
+            <a:schemeClr val="accent1"/>
+          </a:fillRef>
+          <a:effectRef idx="0">
+            <a:schemeClr val="accent1"/>
+          </a:effectRef>
+          <a:fontRef idx="minor">
+            <a:schemeClr val="lt1"/>
+          </a:fontRef>
+        </p:style>
+        <p:txBody>
+          <a:bodyPr rot="0" spcFirstLastPara="0" vert="horz" wrap="square" lIns="91440" tIns="45720" rIns="91440" bIns="45720" numCol="1" spcCol="0" rtlCol="0" fromWordArt="0" anchor="ctr" anchorCtr="0" forceAA="0" compatLnSpc="1">
+            <a:prstTxWarp prst="textNoShape">
+              <a:avLst/>
+            </a:prstTxWarp>
+            <a:noAutofit/>
+          </a:bodyPr>
+          <a:lstStyle/>
+          <a:p>
+            <a:endParaRPr lang="nl-NL"/>
+          </a:p>
+        </p:txBody>
+      </p:sp>
+      <p:sp>
+        <p:nvSpPr>
+          <p:cNvPr id="18" name="Text Box 40">
+            <a:extLst>
+              <a:ext uri="{FF2B5EF4-FFF2-40B4-BE49-F238E27FC236}">
+                <a16:creationId xmlns:a16="http://schemas.microsoft.com/office/drawing/2014/main" id="{86CE350E-9A32-472D-9D63-3DF2C3F31F1E}"/>
+              </a:ext>
+            </a:extLst>
+          </p:cNvPr>
+          <p:cNvSpPr txBox="1"/>
+          <p:nvPr/>
+        </p:nvSpPr>
+        <p:spPr>
+          <a:xfrm>
+            <a:off x="3614206" y="3416107"/>
+            <a:ext cx="621256" cy="126912"/>
+          </a:xfrm>
+          <a:prstGeom prst="rect">
+            <a:avLst/>
+          </a:prstGeom>
+          <a:noFill/>
+          <a:ln w="6350">
+            <a:noFill/>
+          </a:ln>
+        </p:spPr>
+        <p:txBody>
+          <a:bodyPr rot="0" spcFirstLastPara="0" vert="horz" wrap="square" lIns="0" tIns="0" rIns="0" bIns="0" numCol="1" spcCol="0" rtlCol="0" fromWordArt="0" anchor="t" anchorCtr="0" forceAA="0" compatLnSpc="1">
+            <a:prstTxWarp prst="textNoShape">
+              <a:avLst/>
+            </a:prstTxWarp>
+            <a:noAutofit/>
+          </a:bodyPr>
+          <a:lstStyle/>
+          <a:p>
+            <a:pPr marL="0" marR="0" algn="just">
+              <a:spcBef>
+                <a:spcPts val="0"/>
+              </a:spcBef>
+              <a:spcAft>
+                <a:spcPts val="500"/>
+              </a:spcAft>
+            </a:pPr>
+            <a:r>
+              <a:rPr lang="en-US" sz="950" b="1">
+                <a:effectLst/>
+                <a:latin typeface="Proxima Nova Lt" panose="02000506030000020004" pitchFamily="50" charset="0"/>
+                <a:ea typeface="Calibri" panose="020F0502020204030204" pitchFamily="34" charset="0"/>
+                <a:cs typeface="Times New Roman" panose="02020603050405020304" pitchFamily="18" charset="0"/>
+              </a:rPr>
+              <a:t>Exstream</a:t>
+            </a:r>
+            <a:endParaRPr lang="nl-NL" sz="950">
+              <a:effectLst/>
+              <a:latin typeface="NimbusRomNo9L" panose="00000500000000000000" pitchFamily="50" charset="0"/>
+              <a:ea typeface="Calibri" panose="020F0502020204030204" pitchFamily="34" charset="0"/>
+              <a:cs typeface="Times New Roman" panose="02020603050405020304" pitchFamily="18" charset="0"/>
+            </a:endParaRPr>
+          </a:p>
+        </p:txBody>
+      </p:sp>
+      <p:sp>
+        <p:nvSpPr>
+          <p:cNvPr id="19" name="Oval 18">
+            <a:extLst>
+              <a:ext uri="{FF2B5EF4-FFF2-40B4-BE49-F238E27FC236}">
+                <a16:creationId xmlns:a16="http://schemas.microsoft.com/office/drawing/2014/main" id="{BAFF11E3-F794-4C4D-911E-A840FDD0C221}"/>
+              </a:ext>
+            </a:extLst>
+          </p:cNvPr>
+          <p:cNvSpPr/>
+          <p:nvPr/>
+        </p:nvSpPr>
+        <p:spPr>
+          <a:xfrm>
+            <a:off x="3088606" y="3625378"/>
+            <a:ext cx="59356" cy="60756"/>
+          </a:xfrm>
+          <a:prstGeom prst="ellipse">
+            <a:avLst/>
+          </a:prstGeom>
+          <a:solidFill>
+            <a:srgbClr val="5ACA8D"/>
+          </a:solidFill>
+          <a:ln w="9525">
+            <a:solidFill>
+              <a:schemeClr val="tx1">
+                <a:lumMod val="75000"/>
+                <a:lumOff val="25000"/>
+              </a:schemeClr>
+            </a:solidFill>
+          </a:ln>
+        </p:spPr>
+        <p:style>
+          <a:lnRef idx="2">
+            <a:schemeClr val="accent1">
+              <a:shade val="50000"/>
+            </a:schemeClr>
+          </a:lnRef>
+          <a:fillRef idx="1">
+            <a:schemeClr val="accent1"/>
+          </a:fillRef>
+          <a:effectRef idx="0">
+            <a:schemeClr val="accent1"/>
+          </a:effectRef>
+          <a:fontRef idx="minor">
+            <a:schemeClr val="lt1"/>
+          </a:fontRef>
+        </p:style>
+        <p:txBody>
+          <a:bodyPr rot="0" spcFirstLastPara="0" vert="horz" wrap="square" lIns="91440" tIns="45720" rIns="91440" bIns="45720" numCol="1" spcCol="0" rtlCol="0" fromWordArt="0" anchor="ctr" anchorCtr="0" forceAA="0" compatLnSpc="1">
+            <a:prstTxWarp prst="textNoShape">
+              <a:avLst/>
+            </a:prstTxWarp>
+            <a:noAutofit/>
+          </a:bodyPr>
+          <a:lstStyle/>
+          <a:p>
+            <a:endParaRPr lang="nl-NL"/>
+          </a:p>
+        </p:txBody>
+      </p:sp>
+      <p:sp>
+        <p:nvSpPr>
+          <p:cNvPr id="20" name="Text Box 42">
+            <a:extLst>
+              <a:ext uri="{FF2B5EF4-FFF2-40B4-BE49-F238E27FC236}">
+                <a16:creationId xmlns:a16="http://schemas.microsoft.com/office/drawing/2014/main" id="{2BFD099C-E588-47A6-98DF-D1EDC71A57CF}"/>
+              </a:ext>
+            </a:extLst>
+          </p:cNvPr>
+          <p:cNvSpPr txBox="1"/>
+          <p:nvPr/>
+        </p:nvSpPr>
+        <p:spPr>
+          <a:xfrm>
+            <a:off x="3200722" y="3591625"/>
+            <a:ext cx="621256" cy="127298"/>
+          </a:xfrm>
+          <a:prstGeom prst="rect">
+            <a:avLst/>
+          </a:prstGeom>
+          <a:noFill/>
+          <a:ln w="6350">
+            <a:noFill/>
+          </a:ln>
+        </p:spPr>
+        <p:txBody>
+          <a:bodyPr rot="0" spcFirstLastPara="0" vert="horz" wrap="square" lIns="0" tIns="0" rIns="0" bIns="0" numCol="1" spcCol="0" rtlCol="0" fromWordArt="0" anchor="t" anchorCtr="0" forceAA="0" compatLnSpc="1">
+            <a:prstTxWarp prst="textNoShape">
+              <a:avLst/>
+            </a:prstTxWarp>
+            <a:noAutofit/>
+          </a:bodyPr>
+          <a:lstStyle/>
+          <a:p>
+            <a:pPr marL="0" marR="0" algn="just">
+              <a:spcBef>
+                <a:spcPts val="0"/>
+              </a:spcBef>
+              <a:spcAft>
+                <a:spcPts val="500"/>
+              </a:spcAft>
+            </a:pPr>
+            <a:r>
+              <a:rPr lang="en-US" sz="950" b="1">
+                <a:effectLst/>
+                <a:latin typeface="Proxima Nova Lt" panose="02000506030000020004" pitchFamily="50" charset="0"/>
+                <a:ea typeface="Calibri" panose="020F0502020204030204" pitchFamily="34" charset="0"/>
+                <a:cs typeface="Times New Roman" panose="02020603050405020304" pitchFamily="18" charset="0"/>
+              </a:rPr>
+              <a:t>ICARL</a:t>
+            </a:r>
+            <a:endParaRPr lang="nl-NL" sz="950">
+              <a:effectLst/>
+              <a:latin typeface="NimbusRomNo9L" panose="00000500000000000000" pitchFamily="50" charset="0"/>
+              <a:ea typeface="Calibri" panose="020F0502020204030204" pitchFamily="34" charset="0"/>
+              <a:cs typeface="Times New Roman" panose="02020603050405020304" pitchFamily="18" charset="0"/>
+            </a:endParaRPr>
+          </a:p>
+        </p:txBody>
+      </p:sp>
+      <p:sp>
+        <p:nvSpPr>
+          <p:cNvPr id="21" name="Oval 20">
+            <a:extLst>
+              <a:ext uri="{FF2B5EF4-FFF2-40B4-BE49-F238E27FC236}">
+                <a16:creationId xmlns:a16="http://schemas.microsoft.com/office/drawing/2014/main" id="{8A2A931A-2FA4-4693-A57D-2B1093BF8A00}"/>
+              </a:ext>
+            </a:extLst>
+          </p:cNvPr>
+          <p:cNvSpPr/>
+          <p:nvPr/>
+        </p:nvSpPr>
+        <p:spPr>
+          <a:xfrm>
+            <a:off x="3180937" y="3814396"/>
+            <a:ext cx="59356" cy="60756"/>
+          </a:xfrm>
+          <a:prstGeom prst="ellipse">
+            <a:avLst/>
+          </a:prstGeom>
+          <a:solidFill>
+            <a:srgbClr val="5ACA8D"/>
+          </a:solidFill>
+          <a:ln w="9525">
+            <a:solidFill>
+              <a:schemeClr val="tx1">
+                <a:lumMod val="75000"/>
+                <a:lumOff val="25000"/>
+              </a:schemeClr>
+            </a:solidFill>
+          </a:ln>
+        </p:spPr>
+        <p:style>
+          <a:lnRef idx="2">
+            <a:schemeClr val="accent1">
+              <a:shade val="50000"/>
+            </a:schemeClr>
+          </a:lnRef>
+          <a:fillRef idx="1">
+            <a:schemeClr val="accent1"/>
+          </a:fillRef>
+          <a:effectRef idx="0">
+            <a:schemeClr val="accent1"/>
+          </a:effectRef>
+          <a:fontRef idx="minor">
+            <a:schemeClr val="lt1"/>
+          </a:fontRef>
+        </p:style>
+        <p:txBody>
+          <a:bodyPr rot="0" spcFirstLastPara="0" vert="horz" wrap="square" lIns="91440" tIns="45720" rIns="91440" bIns="45720" numCol="1" spcCol="0" rtlCol="0" fromWordArt="0" anchor="ctr" anchorCtr="0" forceAA="0" compatLnSpc="1">
+            <a:prstTxWarp prst="textNoShape">
+              <a:avLst/>
+            </a:prstTxWarp>
+            <a:noAutofit/>
+          </a:bodyPr>
+          <a:lstStyle/>
+          <a:p>
+            <a:endParaRPr lang="nl-NL"/>
+          </a:p>
+        </p:txBody>
+      </p:sp>
+      <p:sp>
+        <p:nvSpPr>
+          <p:cNvPr id="22" name="Text Box 44">
+            <a:extLst>
+              <a:ext uri="{FF2B5EF4-FFF2-40B4-BE49-F238E27FC236}">
+                <a16:creationId xmlns:a16="http://schemas.microsoft.com/office/drawing/2014/main" id="{AD6B1EB4-3CAD-45DF-8255-B462364D5D19}"/>
+              </a:ext>
+            </a:extLst>
+          </p:cNvPr>
+          <p:cNvSpPr txBox="1"/>
+          <p:nvPr/>
+        </p:nvSpPr>
+        <p:spPr>
+          <a:xfrm>
+            <a:off x="3293053" y="3780643"/>
+            <a:ext cx="621256" cy="126912"/>
+          </a:xfrm>
+          <a:prstGeom prst="rect">
+            <a:avLst/>
+          </a:prstGeom>
+          <a:noFill/>
+          <a:ln w="6350">
+            <a:noFill/>
+          </a:ln>
+        </p:spPr>
+        <p:txBody>
+          <a:bodyPr rot="0" spcFirstLastPara="0" vert="horz" wrap="square" lIns="0" tIns="0" rIns="0" bIns="0" numCol="1" spcCol="0" rtlCol="0" fromWordArt="0" anchor="t" anchorCtr="0" forceAA="0" compatLnSpc="1">
+            <a:prstTxWarp prst="textNoShape">
+              <a:avLst/>
+            </a:prstTxWarp>
+            <a:noAutofit/>
+          </a:bodyPr>
+          <a:lstStyle/>
+          <a:p>
+            <a:pPr marL="0" marR="0" algn="just">
+              <a:spcBef>
+                <a:spcPts val="0"/>
+              </a:spcBef>
+              <a:spcAft>
+                <a:spcPts val="500"/>
+              </a:spcAft>
+            </a:pPr>
+            <a:r>
+              <a:rPr lang="en-US" sz="950" b="1">
+                <a:effectLst/>
+                <a:latin typeface="Proxima Nova Lt" panose="02000506030000020004" pitchFamily="50" charset="0"/>
+                <a:ea typeface="Calibri" panose="020F0502020204030204" pitchFamily="34" charset="0"/>
+                <a:cs typeface="Times New Roman" panose="02020603050405020304" pitchFamily="18" charset="0"/>
+              </a:rPr>
+              <a:t>GEM</a:t>
+            </a:r>
+            <a:endParaRPr lang="nl-NL" sz="950">
+              <a:effectLst/>
+              <a:latin typeface="NimbusRomNo9L" panose="00000500000000000000" pitchFamily="50" charset="0"/>
+              <a:ea typeface="Calibri" panose="020F0502020204030204" pitchFamily="34" charset="0"/>
+              <a:cs typeface="Times New Roman" panose="02020603050405020304" pitchFamily="18" charset="0"/>
+            </a:endParaRPr>
+          </a:p>
+        </p:txBody>
+      </p:sp>
+      <p:sp>
+        <p:nvSpPr>
+          <p:cNvPr id="23" name="Oval 22">
+            <a:extLst>
+              <a:ext uri="{FF2B5EF4-FFF2-40B4-BE49-F238E27FC236}">
+                <a16:creationId xmlns:a16="http://schemas.microsoft.com/office/drawing/2014/main" id="{D1399E3C-3CF7-42C3-9073-7B6C90D72E2C}"/>
+              </a:ext>
+            </a:extLst>
+          </p:cNvPr>
+          <p:cNvSpPr/>
+          <p:nvPr/>
+        </p:nvSpPr>
+        <p:spPr>
+          <a:xfrm>
+            <a:off x="4453786" y="3132580"/>
+            <a:ext cx="59356" cy="60756"/>
+          </a:xfrm>
+          <a:prstGeom prst="ellipse">
+            <a:avLst/>
+          </a:prstGeom>
+          <a:solidFill>
+            <a:srgbClr val="D45C60"/>
+          </a:solidFill>
+          <a:ln w="9525">
+            <a:solidFill>
+              <a:schemeClr val="tx1">
+                <a:lumMod val="75000"/>
+                <a:lumOff val="25000"/>
+              </a:schemeClr>
+            </a:solidFill>
+          </a:ln>
+        </p:spPr>
+        <p:style>
+          <a:lnRef idx="2">
+            <a:schemeClr val="accent1">
+              <a:shade val="50000"/>
+            </a:schemeClr>
+          </a:lnRef>
+          <a:fillRef idx="1">
+            <a:schemeClr val="accent1"/>
+          </a:fillRef>
+          <a:effectRef idx="0">
+            <a:schemeClr val="accent1"/>
+          </a:effectRef>
+          <a:fontRef idx="minor">
+            <a:schemeClr val="lt1"/>
+          </a:fontRef>
+        </p:style>
+        <p:txBody>
+          <a:bodyPr rot="0" spcFirstLastPara="0" vert="horz" wrap="square" lIns="91440" tIns="45720" rIns="91440" bIns="45720" numCol="1" spcCol="0" rtlCol="0" fromWordArt="0" anchor="ctr" anchorCtr="0" forceAA="0" compatLnSpc="1">
+            <a:prstTxWarp prst="textNoShape">
+              <a:avLst/>
+            </a:prstTxWarp>
+            <a:noAutofit/>
+          </a:bodyPr>
+          <a:lstStyle/>
+          <a:p>
+            <a:endParaRPr lang="nl-NL"/>
+          </a:p>
+        </p:txBody>
+      </p:sp>
+      <p:sp>
+        <p:nvSpPr>
+          <p:cNvPr id="24" name="Text Box 46">
+            <a:extLst>
+              <a:ext uri="{FF2B5EF4-FFF2-40B4-BE49-F238E27FC236}">
+                <a16:creationId xmlns:a16="http://schemas.microsoft.com/office/drawing/2014/main" id="{C4B02B52-D205-4EA8-ADB8-E648250CB382}"/>
+              </a:ext>
+            </a:extLst>
+          </p:cNvPr>
+          <p:cNvSpPr txBox="1"/>
+          <p:nvPr/>
+        </p:nvSpPr>
+        <p:spPr>
+          <a:xfrm>
+            <a:off x="4565902" y="3098827"/>
+            <a:ext cx="621256" cy="126912"/>
+          </a:xfrm>
+          <a:prstGeom prst="rect">
+            <a:avLst/>
+          </a:prstGeom>
+          <a:noFill/>
+          <a:ln w="6350">
+            <a:noFill/>
+          </a:ln>
+        </p:spPr>
+        <p:txBody>
+          <a:bodyPr rot="0" spcFirstLastPara="0" vert="horz" wrap="square" lIns="0" tIns="0" rIns="0" bIns="0" numCol="1" spcCol="0" rtlCol="0" fromWordArt="0" anchor="t" anchorCtr="0" forceAA="0" compatLnSpc="1">
+            <a:prstTxWarp prst="textNoShape">
+              <a:avLst/>
+            </a:prstTxWarp>
+            <a:noAutofit/>
+          </a:bodyPr>
+          <a:lstStyle/>
+          <a:p>
+            <a:pPr marL="0" marR="0" algn="just">
+              <a:spcBef>
+                <a:spcPts val="0"/>
+              </a:spcBef>
+              <a:spcAft>
+                <a:spcPts val="500"/>
+              </a:spcAft>
+            </a:pPr>
+            <a:r>
+              <a:rPr lang="en-US" sz="950" b="1">
+                <a:effectLst/>
+                <a:latin typeface="Proxima Nova Lt" panose="02000506030000020004" pitchFamily="50" charset="0"/>
+                <a:ea typeface="Calibri" panose="020F0502020204030204" pitchFamily="34" charset="0"/>
+                <a:cs typeface="Times New Roman" panose="02020603050405020304" pitchFamily="18" charset="0"/>
+              </a:rPr>
+              <a:t>GR</a:t>
+            </a:r>
+            <a:endParaRPr lang="nl-NL" sz="950">
+              <a:effectLst/>
+              <a:latin typeface="NimbusRomNo9L" panose="00000500000000000000" pitchFamily="50" charset="0"/>
+              <a:ea typeface="Calibri" panose="020F0502020204030204" pitchFamily="34" charset="0"/>
+              <a:cs typeface="Times New Roman" panose="02020603050405020304" pitchFamily="18" charset="0"/>
+            </a:endParaRPr>
+          </a:p>
+        </p:txBody>
+      </p:sp>
+      <p:sp>
+        <p:nvSpPr>
+          <p:cNvPr id="25" name="Oval 24">
+            <a:extLst>
+              <a:ext uri="{FF2B5EF4-FFF2-40B4-BE49-F238E27FC236}">
+                <a16:creationId xmlns:a16="http://schemas.microsoft.com/office/drawing/2014/main" id="{EE1FAAA2-CCF1-4226-B5EF-33934C64BEF2}"/>
+              </a:ext>
+            </a:extLst>
+          </p:cNvPr>
+          <p:cNvSpPr/>
+          <p:nvPr/>
+        </p:nvSpPr>
+        <p:spPr>
+          <a:xfrm>
+            <a:off x="4196578" y="3287845"/>
+            <a:ext cx="59356" cy="60756"/>
+          </a:xfrm>
+          <a:prstGeom prst="ellipse">
+            <a:avLst/>
+          </a:prstGeom>
+          <a:solidFill>
+            <a:srgbClr val="D45C60"/>
+          </a:solidFill>
+          <a:ln w="9525">
+            <a:solidFill>
+              <a:schemeClr val="tx1">
+                <a:lumMod val="75000"/>
+                <a:lumOff val="25000"/>
+              </a:schemeClr>
+            </a:solidFill>
+          </a:ln>
+        </p:spPr>
+        <p:style>
+          <a:lnRef idx="2">
+            <a:schemeClr val="accent1">
+              <a:shade val="50000"/>
+            </a:schemeClr>
+          </a:lnRef>
+          <a:fillRef idx="1">
+            <a:schemeClr val="accent1"/>
+          </a:fillRef>
+          <a:effectRef idx="0">
+            <a:schemeClr val="accent1"/>
+          </a:effectRef>
+          <a:fontRef idx="minor">
+            <a:schemeClr val="lt1"/>
+          </a:fontRef>
+        </p:style>
+        <p:txBody>
+          <a:bodyPr rot="0" spcFirstLastPara="0" vert="horz" wrap="square" lIns="91440" tIns="45720" rIns="91440" bIns="45720" numCol="1" spcCol="0" rtlCol="0" fromWordArt="0" anchor="ctr" anchorCtr="0" forceAA="0" compatLnSpc="1">
+            <a:prstTxWarp prst="textNoShape">
+              <a:avLst/>
+            </a:prstTxWarp>
+            <a:noAutofit/>
+          </a:bodyPr>
+          <a:lstStyle/>
+          <a:p>
+            <a:endParaRPr lang="nl-NL"/>
+          </a:p>
+        </p:txBody>
+      </p:sp>
+      <p:sp>
+        <p:nvSpPr>
+          <p:cNvPr id="26" name="Text Box 48">
+            <a:extLst>
+              <a:ext uri="{FF2B5EF4-FFF2-40B4-BE49-F238E27FC236}">
+                <a16:creationId xmlns:a16="http://schemas.microsoft.com/office/drawing/2014/main" id="{1AF96080-642A-4696-9415-536EA6602EAC}"/>
+              </a:ext>
+            </a:extLst>
+          </p:cNvPr>
+          <p:cNvSpPr txBox="1"/>
+          <p:nvPr/>
+        </p:nvSpPr>
+        <p:spPr>
+          <a:xfrm>
+            <a:off x="4308694" y="3254092"/>
+            <a:ext cx="621256" cy="126912"/>
+          </a:xfrm>
+          <a:prstGeom prst="rect">
+            <a:avLst/>
+          </a:prstGeom>
+          <a:noFill/>
+          <a:ln w="6350">
+            <a:noFill/>
+          </a:ln>
+        </p:spPr>
+        <p:txBody>
+          <a:bodyPr rot="0" spcFirstLastPara="0" vert="horz" wrap="square" lIns="0" tIns="0" rIns="0" bIns="0" numCol="1" spcCol="0" rtlCol="0" fromWordArt="0" anchor="t" anchorCtr="0" forceAA="0" compatLnSpc="1">
+            <a:prstTxWarp prst="textNoShape">
+              <a:avLst/>
+            </a:prstTxWarp>
+            <a:noAutofit/>
+          </a:bodyPr>
+          <a:lstStyle/>
+          <a:p>
+            <a:pPr marL="0" marR="0" algn="just">
+              <a:spcBef>
+                <a:spcPts val="0"/>
+              </a:spcBef>
+              <a:spcAft>
+                <a:spcPts val="500"/>
+              </a:spcAft>
+            </a:pPr>
+            <a:r>
+              <a:rPr lang="en-US" sz="950" b="1">
+                <a:effectLst/>
+                <a:latin typeface="Proxima Nova Lt" panose="02000506030000020004" pitchFamily="50" charset="0"/>
+                <a:ea typeface="Calibri" panose="020F0502020204030204" pitchFamily="34" charset="0"/>
+                <a:cs typeface="Times New Roman" panose="02020603050405020304" pitchFamily="18" charset="0"/>
+              </a:rPr>
+              <a:t>MeRGAN</a:t>
+            </a:r>
+            <a:endParaRPr lang="nl-NL" sz="950">
+              <a:effectLst/>
+              <a:latin typeface="NimbusRomNo9L" panose="00000500000000000000" pitchFamily="50" charset="0"/>
+              <a:ea typeface="Calibri" panose="020F0502020204030204" pitchFamily="34" charset="0"/>
+              <a:cs typeface="Times New Roman" panose="02020603050405020304" pitchFamily="18" charset="0"/>
+            </a:endParaRPr>
+          </a:p>
+        </p:txBody>
+      </p:sp>
+      <p:sp>
+        <p:nvSpPr>
+          <p:cNvPr id="27" name="Oval 26">
+            <a:extLst>
+              <a:ext uri="{FF2B5EF4-FFF2-40B4-BE49-F238E27FC236}">
+                <a16:creationId xmlns:a16="http://schemas.microsoft.com/office/drawing/2014/main" id="{1C1DBCD8-2BAB-4D59-B5F7-58F4DF9FB005}"/>
+              </a:ext>
+            </a:extLst>
+          </p:cNvPr>
+          <p:cNvSpPr/>
+          <p:nvPr/>
+        </p:nvSpPr>
+        <p:spPr>
+          <a:xfrm>
+            <a:off x="4477318" y="3586225"/>
+            <a:ext cx="59356" cy="60756"/>
+          </a:xfrm>
+          <a:prstGeom prst="ellipse">
+            <a:avLst/>
+          </a:prstGeom>
+          <a:solidFill>
+            <a:srgbClr val="D45C60"/>
+          </a:solidFill>
+          <a:ln w="9525">
+            <a:solidFill>
+              <a:schemeClr val="tx1">
+                <a:lumMod val="75000"/>
+                <a:lumOff val="25000"/>
+              </a:schemeClr>
+            </a:solidFill>
+          </a:ln>
+        </p:spPr>
+        <p:style>
+          <a:lnRef idx="2">
+            <a:schemeClr val="accent1">
+              <a:shade val="50000"/>
+            </a:schemeClr>
+          </a:lnRef>
+          <a:fillRef idx="1">
+            <a:schemeClr val="accent1"/>
+          </a:fillRef>
+          <a:effectRef idx="0">
+            <a:schemeClr val="accent1"/>
+          </a:effectRef>
+          <a:fontRef idx="minor">
+            <a:schemeClr val="lt1"/>
+          </a:fontRef>
+        </p:style>
+        <p:txBody>
+          <a:bodyPr rot="0" spcFirstLastPara="0" vert="horz" wrap="square" lIns="91440" tIns="45720" rIns="91440" bIns="45720" numCol="1" spcCol="0" rtlCol="0" fromWordArt="0" anchor="ctr" anchorCtr="0" forceAA="0" compatLnSpc="1">
+            <a:prstTxWarp prst="textNoShape">
+              <a:avLst/>
+            </a:prstTxWarp>
+            <a:noAutofit/>
+          </a:bodyPr>
+          <a:lstStyle/>
+          <a:p>
+            <a:endParaRPr lang="nl-NL"/>
+          </a:p>
+        </p:txBody>
+      </p:sp>
+      <p:sp>
+        <p:nvSpPr>
+          <p:cNvPr id="28" name="Text Box 50">
+            <a:extLst>
+              <a:ext uri="{FF2B5EF4-FFF2-40B4-BE49-F238E27FC236}">
+                <a16:creationId xmlns:a16="http://schemas.microsoft.com/office/drawing/2014/main" id="{9D9A4054-52FC-410F-AD1C-D0C5D00F625E}"/>
+              </a:ext>
+            </a:extLst>
+          </p:cNvPr>
+          <p:cNvSpPr txBox="1"/>
+          <p:nvPr/>
+        </p:nvSpPr>
+        <p:spPr>
+          <a:xfrm>
+            <a:off x="4589433" y="3559222"/>
+            <a:ext cx="621256" cy="126912"/>
+          </a:xfrm>
+          <a:prstGeom prst="rect">
+            <a:avLst/>
+          </a:prstGeom>
+          <a:noFill/>
+          <a:ln w="6350">
+            <a:noFill/>
+          </a:ln>
+        </p:spPr>
+        <p:txBody>
+          <a:bodyPr rot="0" spcFirstLastPara="0" vert="horz" wrap="square" lIns="0" tIns="0" rIns="0" bIns="0" numCol="1" spcCol="0" rtlCol="0" fromWordArt="0" anchor="t" anchorCtr="0" forceAA="0" compatLnSpc="1">
+            <a:prstTxWarp prst="textNoShape">
+              <a:avLst/>
+            </a:prstTxWarp>
+            <a:noAutofit/>
+          </a:bodyPr>
+          <a:lstStyle/>
+          <a:p>
+            <a:pPr marL="0" marR="0" algn="just">
+              <a:spcBef>
+                <a:spcPts val="0"/>
+              </a:spcBef>
+              <a:spcAft>
+                <a:spcPts val="500"/>
+              </a:spcAft>
+            </a:pPr>
+            <a:r>
+              <a:rPr lang="en-US" sz="950" b="1">
+                <a:effectLst/>
+                <a:latin typeface="Proxima Nova Lt" panose="02000506030000020004" pitchFamily="50" charset="0"/>
+                <a:ea typeface="Calibri" panose="020F0502020204030204" pitchFamily="34" charset="0"/>
+                <a:cs typeface="Times New Roman" panose="02020603050405020304" pitchFamily="18" charset="0"/>
+              </a:rPr>
+              <a:t>FearNet</a:t>
+            </a:r>
+            <a:endParaRPr lang="nl-NL" sz="950">
+              <a:effectLst/>
+              <a:latin typeface="NimbusRomNo9L" panose="00000500000000000000" pitchFamily="50" charset="0"/>
+              <a:ea typeface="Calibri" panose="020F0502020204030204" pitchFamily="34" charset="0"/>
+              <a:cs typeface="Times New Roman" panose="02020603050405020304" pitchFamily="18" charset="0"/>
+            </a:endParaRPr>
+          </a:p>
+        </p:txBody>
+      </p:sp>
+      <p:sp>
+        <p:nvSpPr>
+          <p:cNvPr id="29" name="Oval 28">
+            <a:extLst>
+              <a:ext uri="{FF2B5EF4-FFF2-40B4-BE49-F238E27FC236}">
+                <a16:creationId xmlns:a16="http://schemas.microsoft.com/office/drawing/2014/main" id="{03068A9D-7BF5-4870-9C06-97DBF8D7DB83}"/>
+              </a:ext>
+            </a:extLst>
+          </p:cNvPr>
+          <p:cNvSpPr/>
+          <p:nvPr/>
+        </p:nvSpPr>
+        <p:spPr>
+          <a:xfrm>
+            <a:off x="4440596" y="3733388"/>
+            <a:ext cx="59356" cy="60756"/>
+          </a:xfrm>
+          <a:prstGeom prst="ellipse">
+            <a:avLst/>
+          </a:prstGeom>
+          <a:solidFill>
+            <a:srgbClr val="D45C60"/>
+          </a:solidFill>
+          <a:ln w="9525">
+            <a:solidFill>
+              <a:schemeClr val="tx1">
+                <a:lumMod val="75000"/>
+                <a:lumOff val="25000"/>
+              </a:schemeClr>
+            </a:solidFill>
+          </a:ln>
+        </p:spPr>
+        <p:style>
+          <a:lnRef idx="2">
+            <a:schemeClr val="accent1">
+              <a:shade val="50000"/>
+            </a:schemeClr>
+          </a:lnRef>
+          <a:fillRef idx="1">
+            <a:schemeClr val="accent1"/>
+          </a:fillRef>
+          <a:effectRef idx="0">
+            <a:schemeClr val="accent1"/>
+          </a:effectRef>
+          <a:fontRef idx="minor">
+            <a:schemeClr val="lt1"/>
+          </a:fontRef>
+        </p:style>
+        <p:txBody>
+          <a:bodyPr rot="0" spcFirstLastPara="0" vert="horz" wrap="square" lIns="91440" tIns="45720" rIns="91440" bIns="45720" numCol="1" spcCol="0" rtlCol="0" fromWordArt="0" anchor="ctr" anchorCtr="0" forceAA="0" compatLnSpc="1">
+            <a:prstTxWarp prst="textNoShape">
+              <a:avLst/>
+            </a:prstTxWarp>
+            <a:noAutofit/>
+          </a:bodyPr>
+          <a:lstStyle/>
+          <a:p>
+            <a:endParaRPr lang="nl-NL"/>
+          </a:p>
+        </p:txBody>
+      </p:sp>
+      <p:sp>
+        <p:nvSpPr>
+          <p:cNvPr id="30" name="Text Box 54">
+            <a:extLst>
+              <a:ext uri="{FF2B5EF4-FFF2-40B4-BE49-F238E27FC236}">
+                <a16:creationId xmlns:a16="http://schemas.microsoft.com/office/drawing/2014/main" id="{76804E30-7969-4813-8214-2D9EA2E31F2F}"/>
+              </a:ext>
+            </a:extLst>
+          </p:cNvPr>
+          <p:cNvSpPr txBox="1"/>
+          <p:nvPr/>
+        </p:nvSpPr>
+        <p:spPr>
+          <a:xfrm>
+            <a:off x="4552712" y="3699635"/>
+            <a:ext cx="621256" cy="126912"/>
+          </a:xfrm>
+          <a:prstGeom prst="rect">
+            <a:avLst/>
+          </a:prstGeom>
+          <a:noFill/>
+          <a:ln w="6350">
+            <a:noFill/>
+          </a:ln>
+        </p:spPr>
+        <p:txBody>
+          <a:bodyPr rot="0" spcFirstLastPara="0" vert="horz" wrap="square" lIns="0" tIns="0" rIns="0" bIns="0" numCol="1" spcCol="0" rtlCol="0" fromWordArt="0" anchor="t" anchorCtr="0" forceAA="0" compatLnSpc="1">
+            <a:prstTxWarp prst="textNoShape">
+              <a:avLst/>
+            </a:prstTxWarp>
+            <a:noAutofit/>
+          </a:bodyPr>
+          <a:lstStyle/>
+          <a:p>
+            <a:pPr marL="0" marR="0" algn="just">
+              <a:spcBef>
+                <a:spcPts val="0"/>
+              </a:spcBef>
+              <a:spcAft>
+                <a:spcPts val="500"/>
+              </a:spcAft>
+            </a:pPr>
+            <a:r>
+              <a:rPr lang="en-US" sz="950" b="1">
+                <a:effectLst/>
+                <a:latin typeface="Proxima Nova Lt" panose="02000506030000020004" pitchFamily="50" charset="0"/>
+                <a:ea typeface="Calibri" panose="020F0502020204030204" pitchFamily="34" charset="0"/>
+                <a:cs typeface="Times New Roman" panose="02020603050405020304" pitchFamily="18" charset="0"/>
+              </a:rPr>
+              <a:t>GDM</a:t>
+            </a:r>
+            <a:endParaRPr lang="nl-NL" sz="950">
+              <a:effectLst/>
+              <a:latin typeface="NimbusRomNo9L" panose="00000500000000000000" pitchFamily="50" charset="0"/>
+              <a:ea typeface="Calibri" panose="020F0502020204030204" pitchFamily="34" charset="0"/>
+              <a:cs typeface="Times New Roman" panose="02020603050405020304" pitchFamily="18" charset="0"/>
+            </a:endParaRPr>
+          </a:p>
+        </p:txBody>
+      </p:sp>
+      <p:sp>
+        <p:nvSpPr>
+          <p:cNvPr id="31" name="Oval 30">
+            <a:extLst>
+              <a:ext uri="{FF2B5EF4-FFF2-40B4-BE49-F238E27FC236}">
+                <a16:creationId xmlns:a16="http://schemas.microsoft.com/office/drawing/2014/main" id="{11A81D7A-7C04-493C-BDBC-866EC76FD792}"/>
+              </a:ext>
+            </a:extLst>
+          </p:cNvPr>
+          <p:cNvSpPr/>
+          <p:nvPr/>
+        </p:nvSpPr>
+        <p:spPr>
+          <a:xfrm>
+            <a:off x="4902251" y="3949409"/>
+            <a:ext cx="59356" cy="60756"/>
+          </a:xfrm>
+          <a:prstGeom prst="ellipse">
+            <a:avLst/>
+          </a:prstGeom>
+          <a:solidFill>
+            <a:srgbClr val="4F909F"/>
+          </a:solidFill>
+          <a:ln w="9525">
+            <a:solidFill>
+              <a:schemeClr val="tx1">
+                <a:lumMod val="75000"/>
+                <a:lumOff val="25000"/>
+              </a:schemeClr>
+            </a:solidFill>
+          </a:ln>
+        </p:spPr>
+        <p:style>
+          <a:lnRef idx="2">
+            <a:schemeClr val="accent1">
+              <a:shade val="50000"/>
+            </a:schemeClr>
+          </a:lnRef>
+          <a:fillRef idx="1">
+            <a:schemeClr val="accent1"/>
+          </a:fillRef>
+          <a:effectRef idx="0">
+            <a:schemeClr val="accent1"/>
+          </a:effectRef>
+          <a:fontRef idx="minor">
+            <a:schemeClr val="lt1"/>
+          </a:fontRef>
+        </p:style>
+        <p:txBody>
+          <a:bodyPr rot="0" spcFirstLastPara="0" vert="horz" wrap="square" lIns="91440" tIns="45720" rIns="91440" bIns="45720" numCol="1" spcCol="0" rtlCol="0" fromWordArt="0" anchor="ctr" anchorCtr="0" forceAA="0" compatLnSpc="1">
+            <a:prstTxWarp prst="textNoShape">
+              <a:avLst/>
+            </a:prstTxWarp>
+            <a:noAutofit/>
+          </a:bodyPr>
+          <a:lstStyle/>
+          <a:p>
+            <a:endParaRPr lang="nl-NL"/>
+          </a:p>
+        </p:txBody>
+      </p:sp>
+      <p:sp>
+        <p:nvSpPr>
+          <p:cNvPr id="32" name="Text Box 56">
+            <a:extLst>
+              <a:ext uri="{FF2B5EF4-FFF2-40B4-BE49-F238E27FC236}">
+                <a16:creationId xmlns:a16="http://schemas.microsoft.com/office/drawing/2014/main" id="{B0845C4C-C5A6-423D-9AA8-656C34C921D9}"/>
+              </a:ext>
+            </a:extLst>
+          </p:cNvPr>
+          <p:cNvSpPr txBox="1"/>
+          <p:nvPr/>
+        </p:nvSpPr>
+        <p:spPr>
+          <a:xfrm>
+            <a:off x="5014367" y="3915656"/>
+            <a:ext cx="621256" cy="126912"/>
+          </a:xfrm>
+          <a:prstGeom prst="rect">
+            <a:avLst/>
+          </a:prstGeom>
+          <a:noFill/>
+          <a:ln w="6350">
+            <a:noFill/>
+          </a:ln>
+        </p:spPr>
+        <p:txBody>
+          <a:bodyPr rot="0" spcFirstLastPara="0" vert="horz" wrap="square" lIns="0" tIns="0" rIns="0" bIns="0" numCol="1" spcCol="0" rtlCol="0" fromWordArt="0" anchor="t" anchorCtr="0" forceAA="0" compatLnSpc="1">
+            <a:prstTxWarp prst="textNoShape">
+              <a:avLst/>
+            </a:prstTxWarp>
+            <a:noAutofit/>
+          </a:bodyPr>
+          <a:lstStyle/>
+          <a:p>
+            <a:pPr marL="0" marR="0" algn="just">
+              <a:spcBef>
+                <a:spcPts val="0"/>
+              </a:spcBef>
+              <a:spcAft>
+                <a:spcPts val="500"/>
+              </a:spcAft>
+            </a:pPr>
+            <a:r>
+              <a:rPr lang="en-US" sz="950" b="1">
+                <a:effectLst/>
+                <a:latin typeface="Proxima Nova Lt" panose="02000506030000020004" pitchFamily="50" charset="0"/>
+                <a:ea typeface="Calibri" panose="020F0502020204030204" pitchFamily="34" charset="0"/>
+                <a:cs typeface="Times New Roman" panose="02020603050405020304" pitchFamily="18" charset="0"/>
+              </a:rPr>
+              <a:t>CWR</a:t>
+            </a:r>
+            <a:endParaRPr lang="nl-NL" sz="950">
+              <a:effectLst/>
+              <a:latin typeface="NimbusRomNo9L" panose="00000500000000000000" pitchFamily="50" charset="0"/>
+              <a:ea typeface="Calibri" panose="020F0502020204030204" pitchFamily="34" charset="0"/>
+              <a:cs typeface="Times New Roman" panose="02020603050405020304" pitchFamily="18" charset="0"/>
+            </a:endParaRPr>
+          </a:p>
+        </p:txBody>
+      </p:sp>
+      <p:sp>
+        <p:nvSpPr>
+          <p:cNvPr id="33" name="Oval 32">
+            <a:extLst>
+              <a:ext uri="{FF2B5EF4-FFF2-40B4-BE49-F238E27FC236}">
+                <a16:creationId xmlns:a16="http://schemas.microsoft.com/office/drawing/2014/main" id="{8630195E-EB48-40C7-A106-B91EDC036C59}"/>
+              </a:ext>
+            </a:extLst>
+          </p:cNvPr>
+          <p:cNvSpPr/>
+          <p:nvPr/>
+        </p:nvSpPr>
+        <p:spPr>
+          <a:xfrm>
+            <a:off x="4743969" y="4185682"/>
+            <a:ext cx="59356" cy="60756"/>
+          </a:xfrm>
+          <a:prstGeom prst="ellipse">
+            <a:avLst/>
+          </a:prstGeom>
+          <a:solidFill>
+            <a:srgbClr val="4F909F"/>
+          </a:solidFill>
+          <a:ln w="9525">
+            <a:solidFill>
+              <a:schemeClr val="tx1">
+                <a:lumMod val="75000"/>
+                <a:lumOff val="25000"/>
+              </a:schemeClr>
+            </a:solidFill>
+          </a:ln>
+        </p:spPr>
+        <p:style>
+          <a:lnRef idx="2">
+            <a:schemeClr val="accent1">
+              <a:shade val="50000"/>
+            </a:schemeClr>
+          </a:lnRef>
+          <a:fillRef idx="1">
+            <a:schemeClr val="accent1"/>
+          </a:fillRef>
+          <a:effectRef idx="0">
+            <a:schemeClr val="accent1"/>
+          </a:effectRef>
+          <a:fontRef idx="minor">
+            <a:schemeClr val="lt1"/>
+          </a:fontRef>
+        </p:style>
+        <p:txBody>
+          <a:bodyPr rot="0" spcFirstLastPara="0" vert="horz" wrap="square" lIns="91440" tIns="45720" rIns="91440" bIns="45720" numCol="1" spcCol="0" rtlCol="0" fromWordArt="0" anchor="ctr" anchorCtr="0" forceAA="0" compatLnSpc="1">
+            <a:prstTxWarp prst="textNoShape">
+              <a:avLst/>
+            </a:prstTxWarp>
+            <a:noAutofit/>
+          </a:bodyPr>
+          <a:lstStyle/>
+          <a:p>
+            <a:endParaRPr lang="nl-NL"/>
+          </a:p>
+        </p:txBody>
+      </p:sp>
+      <p:sp>
+        <p:nvSpPr>
+          <p:cNvPr id="34" name="Text Box 58">
+            <a:extLst>
+              <a:ext uri="{FF2B5EF4-FFF2-40B4-BE49-F238E27FC236}">
+                <a16:creationId xmlns:a16="http://schemas.microsoft.com/office/drawing/2014/main" id="{388E9EAC-4CE0-4633-9C26-0B6C91BABD17}"/>
+              </a:ext>
+            </a:extLst>
+          </p:cNvPr>
+          <p:cNvSpPr txBox="1"/>
+          <p:nvPr/>
+        </p:nvSpPr>
+        <p:spPr>
+          <a:xfrm>
+            <a:off x="4856085" y="4151929"/>
+            <a:ext cx="621256" cy="126912"/>
+          </a:xfrm>
+          <a:prstGeom prst="rect">
+            <a:avLst/>
+          </a:prstGeom>
+          <a:noFill/>
+          <a:ln w="6350">
+            <a:noFill/>
+          </a:ln>
+        </p:spPr>
+        <p:txBody>
+          <a:bodyPr rot="0" spcFirstLastPara="0" vert="horz" wrap="square" lIns="0" tIns="0" rIns="0" bIns="0" numCol="1" spcCol="0" rtlCol="0" fromWordArt="0" anchor="t" anchorCtr="0" forceAA="0" compatLnSpc="1">
+            <a:prstTxWarp prst="textNoShape">
+              <a:avLst/>
+            </a:prstTxWarp>
+            <a:noAutofit/>
+          </a:bodyPr>
+          <a:lstStyle/>
+          <a:p>
+            <a:pPr marL="0" marR="0" algn="just">
+              <a:spcBef>
+                <a:spcPts val="0"/>
+              </a:spcBef>
+              <a:spcAft>
+                <a:spcPts val="500"/>
+              </a:spcAft>
+            </a:pPr>
+            <a:r>
+              <a:rPr lang="en-US" sz="950" b="1">
+                <a:effectLst/>
+                <a:latin typeface="Proxima Nova Lt" panose="02000506030000020004" pitchFamily="50" charset="0"/>
+                <a:ea typeface="Calibri" panose="020F0502020204030204" pitchFamily="34" charset="0"/>
+                <a:cs typeface="Times New Roman" panose="02020603050405020304" pitchFamily="18" charset="0"/>
+              </a:rPr>
+              <a:t>PNN</a:t>
+            </a:r>
+            <a:endParaRPr lang="nl-NL" sz="950">
+              <a:effectLst/>
+              <a:latin typeface="NimbusRomNo9L" panose="00000500000000000000" pitchFamily="50" charset="0"/>
+              <a:ea typeface="Calibri" panose="020F0502020204030204" pitchFamily="34" charset="0"/>
+              <a:cs typeface="Times New Roman" panose="02020603050405020304" pitchFamily="18" charset="0"/>
+            </a:endParaRPr>
+          </a:p>
+        </p:txBody>
+      </p:sp>
+      <p:sp>
+        <p:nvSpPr>
+          <p:cNvPr id="35" name="Text Box 61">
+            <a:extLst>
+              <a:ext uri="{FF2B5EF4-FFF2-40B4-BE49-F238E27FC236}">
+                <a16:creationId xmlns:a16="http://schemas.microsoft.com/office/drawing/2014/main" id="{786B8836-08E4-43A7-A906-102128A1D461}"/>
+              </a:ext>
+            </a:extLst>
+          </p:cNvPr>
+          <p:cNvSpPr txBox="1"/>
+          <p:nvPr/>
+        </p:nvSpPr>
+        <p:spPr>
+          <a:xfrm>
+            <a:off x="4170198" y="2842302"/>
+            <a:ext cx="1053992" cy="259900"/>
+          </a:xfrm>
+          <a:prstGeom prst="rect">
+            <a:avLst/>
+          </a:prstGeom>
+          <a:noFill/>
+          <a:ln w="6350">
+            <a:noFill/>
+          </a:ln>
+        </p:spPr>
+        <p:txBody>
+          <a:bodyPr rot="0" spcFirstLastPara="0" vert="horz" wrap="square" lIns="0" tIns="0" rIns="0" bIns="0" numCol="1" spcCol="0" rtlCol="0" fromWordArt="0" anchor="t" anchorCtr="0" forceAA="0" compatLnSpc="1">
+            <a:prstTxWarp prst="textNoShape">
+              <a:avLst/>
+            </a:prstTxWarp>
+            <a:noAutofit/>
+          </a:bodyPr>
+          <a:lstStyle/>
+          <a:p>
+            <a:pPr marL="0" marR="0" algn="just">
+              <a:spcBef>
+                <a:spcPts val="0"/>
+              </a:spcBef>
+              <a:spcAft>
+                <a:spcPts val="500"/>
+              </a:spcAft>
+            </a:pPr>
+            <a:r>
+              <a:rPr lang="en-US" sz="950" b="1">
+                <a:effectLst/>
+                <a:latin typeface="Proxima Nova Lt" panose="02000506030000020004" pitchFamily="50" charset="0"/>
+                <a:ea typeface="Calibri" panose="020F0502020204030204" pitchFamily="34" charset="0"/>
+                <a:cs typeface="Times New Roman" panose="02020603050405020304" pitchFamily="18" charset="0"/>
+              </a:rPr>
+              <a:t>Generative Replay</a:t>
+            </a:r>
+            <a:endParaRPr lang="nl-NL" sz="950">
+              <a:effectLst/>
+              <a:latin typeface="NimbusRomNo9L" panose="00000500000000000000" pitchFamily="50" charset="0"/>
+              <a:ea typeface="Calibri" panose="020F0502020204030204" pitchFamily="34" charset="0"/>
+              <a:cs typeface="Times New Roman" panose="02020603050405020304" pitchFamily="18" charset="0"/>
+            </a:endParaRPr>
+          </a:p>
+        </p:txBody>
+      </p:sp>
+      <p:sp>
+        <p:nvSpPr>
+          <p:cNvPr id="36" name="Text Box 62">
+            <a:extLst>
+              <a:ext uri="{FF2B5EF4-FFF2-40B4-BE49-F238E27FC236}">
+                <a16:creationId xmlns:a16="http://schemas.microsoft.com/office/drawing/2014/main" id="{7B03F913-57B0-4EB0-8153-B33E49A09133}"/>
+              </a:ext>
+            </a:extLst>
+          </p:cNvPr>
+          <p:cNvSpPr txBox="1"/>
+          <p:nvPr/>
+        </p:nvSpPr>
+        <p:spPr>
+          <a:xfrm>
+            <a:off x="2626950" y="5090271"/>
+            <a:ext cx="845390" cy="259900"/>
+          </a:xfrm>
+          <a:prstGeom prst="rect">
+            <a:avLst/>
+          </a:prstGeom>
+          <a:noFill/>
+          <a:ln w="6350">
+            <a:noFill/>
+          </a:ln>
+        </p:spPr>
+        <p:txBody>
+          <a:bodyPr rot="0" spcFirstLastPara="0" vert="horz" wrap="square" lIns="0" tIns="0" rIns="0" bIns="0" numCol="1" spcCol="0" rtlCol="0" fromWordArt="0" anchor="t" anchorCtr="0" forceAA="0" compatLnSpc="1">
+            <a:prstTxWarp prst="textNoShape">
+              <a:avLst/>
+            </a:prstTxWarp>
+            <a:noAutofit/>
+          </a:bodyPr>
+          <a:lstStyle/>
+          <a:p>
+            <a:pPr marL="0" marR="0" algn="just">
+              <a:spcBef>
+                <a:spcPts val="0"/>
+              </a:spcBef>
+              <a:spcAft>
+                <a:spcPts val="500"/>
+              </a:spcAft>
+            </a:pPr>
+            <a:r>
+              <a:rPr lang="en-US" sz="950" b="1">
+                <a:effectLst/>
+                <a:latin typeface="Proxima Nova Lt" panose="02000506030000020004" pitchFamily="50" charset="0"/>
+                <a:ea typeface="Calibri" panose="020F0502020204030204" pitchFamily="34" charset="0"/>
+                <a:cs typeface="Times New Roman" panose="02020603050405020304" pitchFamily="18" charset="0"/>
+              </a:rPr>
+              <a:t>Regularization</a:t>
+            </a:r>
+            <a:endParaRPr lang="nl-NL" sz="950">
+              <a:effectLst/>
+              <a:latin typeface="NimbusRomNo9L" panose="00000500000000000000" pitchFamily="50" charset="0"/>
+              <a:ea typeface="Calibri" panose="020F0502020204030204" pitchFamily="34" charset="0"/>
+              <a:cs typeface="Times New Roman" panose="02020603050405020304" pitchFamily="18" charset="0"/>
+            </a:endParaRPr>
+          </a:p>
+        </p:txBody>
+      </p:sp>
+      <p:sp>
+        <p:nvSpPr>
+          <p:cNvPr id="37" name="Text Box 64">
+            <a:extLst>
+              <a:ext uri="{FF2B5EF4-FFF2-40B4-BE49-F238E27FC236}">
+                <a16:creationId xmlns:a16="http://schemas.microsoft.com/office/drawing/2014/main" id="{B4809079-F48C-44FE-B754-8BA99331A351}"/>
+              </a:ext>
+            </a:extLst>
+          </p:cNvPr>
+          <p:cNvSpPr txBox="1"/>
+          <p:nvPr/>
+        </p:nvSpPr>
+        <p:spPr>
+          <a:xfrm>
+            <a:off x="4506546" y="5090271"/>
+            <a:ext cx="845390" cy="259900"/>
+          </a:xfrm>
+          <a:prstGeom prst="rect">
+            <a:avLst/>
+          </a:prstGeom>
+          <a:noFill/>
+          <a:ln w="6350">
+            <a:noFill/>
+          </a:ln>
+        </p:spPr>
+        <p:txBody>
+          <a:bodyPr rot="0" spcFirstLastPara="0" vert="horz" wrap="square" lIns="0" tIns="0" rIns="0" bIns="0" numCol="1" spcCol="0" rtlCol="0" fromWordArt="0" anchor="t" anchorCtr="0" forceAA="0" compatLnSpc="1">
+            <a:prstTxWarp prst="textNoShape">
+              <a:avLst/>
+            </a:prstTxWarp>
+            <a:noAutofit/>
+          </a:bodyPr>
+          <a:lstStyle/>
+          <a:p>
+            <a:pPr marL="0" marR="0" algn="just">
+              <a:spcBef>
+                <a:spcPts val="0"/>
+              </a:spcBef>
+              <a:spcAft>
+                <a:spcPts val="500"/>
+              </a:spcAft>
+            </a:pPr>
+            <a:r>
+              <a:rPr lang="en-US" sz="950" b="1">
+                <a:effectLst/>
+                <a:latin typeface="Proxima Nova Lt" panose="02000506030000020004" pitchFamily="50" charset="0"/>
+                <a:ea typeface="Calibri" panose="020F0502020204030204" pitchFamily="34" charset="0"/>
+                <a:cs typeface="Times New Roman" panose="02020603050405020304" pitchFamily="18" charset="0"/>
+              </a:rPr>
+              <a:t>Architectural</a:t>
+            </a:r>
+            <a:endParaRPr lang="nl-NL" sz="950">
+              <a:effectLst/>
+              <a:latin typeface="NimbusRomNo9L" panose="00000500000000000000" pitchFamily="50" charset="0"/>
+              <a:ea typeface="Calibri" panose="020F0502020204030204" pitchFamily="34" charset="0"/>
+              <a:cs typeface="Times New Roman" panose="02020603050405020304" pitchFamily="18" charset="0"/>
+            </a:endParaRPr>
+          </a:p>
+        </p:txBody>
+      </p:sp>
+      <p:sp>
+        <p:nvSpPr>
+          <p:cNvPr id="38" name="Text Box 65">
+            <a:extLst>
+              <a:ext uri="{FF2B5EF4-FFF2-40B4-BE49-F238E27FC236}">
+                <a16:creationId xmlns:a16="http://schemas.microsoft.com/office/drawing/2014/main" id="{E988F21C-796F-4858-A254-80AF91B6B3CA}"/>
+              </a:ext>
+            </a:extLst>
+          </p:cNvPr>
+          <p:cNvSpPr txBox="1"/>
+          <p:nvPr/>
+        </p:nvSpPr>
+        <p:spPr>
+          <a:xfrm>
+            <a:off x="3180937" y="3085325"/>
+            <a:ext cx="621256" cy="257200"/>
+          </a:xfrm>
+          <a:prstGeom prst="rect">
+            <a:avLst/>
+          </a:prstGeom>
+          <a:noFill/>
+          <a:ln w="6350">
+            <a:noFill/>
+          </a:ln>
+        </p:spPr>
+        <p:txBody>
+          <a:bodyPr rot="0" spcFirstLastPara="0" vert="horz" wrap="square" lIns="0" tIns="0" rIns="0" bIns="0" numCol="1" spcCol="0" rtlCol="0" fromWordArt="0" anchor="t" anchorCtr="0" forceAA="0" compatLnSpc="1">
+            <a:prstTxWarp prst="textNoShape">
+              <a:avLst/>
+            </a:prstTxWarp>
+            <a:noAutofit/>
+          </a:bodyPr>
+          <a:lstStyle/>
+          <a:p>
+            <a:pPr marL="0" marR="0" algn="just">
+              <a:spcBef>
+                <a:spcPts val="0"/>
+              </a:spcBef>
+              <a:spcAft>
+                <a:spcPts val="500"/>
+              </a:spcAft>
+            </a:pPr>
+            <a:r>
+              <a:rPr lang="en-US" sz="950" b="1">
+                <a:effectLst/>
+                <a:latin typeface="Proxima Nova Lt" panose="02000506030000020004" pitchFamily="50" charset="0"/>
+                <a:ea typeface="Calibri" panose="020F0502020204030204" pitchFamily="34" charset="0"/>
+                <a:cs typeface="Times New Roman" panose="02020603050405020304" pitchFamily="18" charset="0"/>
+              </a:rPr>
+              <a:t>Pure rehearsal</a:t>
+            </a:r>
+            <a:endParaRPr lang="nl-NL" sz="950">
+              <a:effectLst/>
+              <a:latin typeface="NimbusRomNo9L" panose="00000500000000000000" pitchFamily="50" charset="0"/>
+              <a:ea typeface="Calibri" panose="020F0502020204030204" pitchFamily="34" charset="0"/>
+              <a:cs typeface="Times New Roman" panose="02020603050405020304" pitchFamily="18" charset="0"/>
+            </a:endParaRPr>
+          </a:p>
+        </p:txBody>
+      </p:sp>
+      <p:sp>
+        <p:nvSpPr>
+          <p:cNvPr id="39" name="Oval 38">
+            <a:extLst>
+              <a:ext uri="{FF2B5EF4-FFF2-40B4-BE49-F238E27FC236}">
+                <a16:creationId xmlns:a16="http://schemas.microsoft.com/office/drawing/2014/main" id="{9B0DFDB4-C3E3-4268-A54F-88CF5612F7C0}"/>
+              </a:ext>
+            </a:extLst>
+          </p:cNvPr>
+          <p:cNvSpPr/>
+          <p:nvPr/>
+        </p:nvSpPr>
+        <p:spPr>
+          <a:xfrm>
+            <a:off x="3850316" y="4921881"/>
+            <a:ext cx="59356" cy="60756"/>
+          </a:xfrm>
+          <a:prstGeom prst="ellipse">
+            <a:avLst/>
+          </a:prstGeom>
+          <a:solidFill>
+            <a:srgbClr val="FFC000"/>
+          </a:solidFill>
+          <a:ln w="9525">
+            <a:solidFill>
+              <a:schemeClr val="tx1">
+                <a:lumMod val="75000"/>
+                <a:lumOff val="25000"/>
+              </a:schemeClr>
+            </a:solidFill>
+          </a:ln>
+        </p:spPr>
+        <p:style>
+          <a:lnRef idx="2">
+            <a:schemeClr val="accent1">
+              <a:shade val="50000"/>
+            </a:schemeClr>
+          </a:lnRef>
+          <a:fillRef idx="1">
+            <a:schemeClr val="accent1"/>
+          </a:fillRef>
+          <a:effectRef idx="0">
+            <a:schemeClr val="accent1"/>
+          </a:effectRef>
+          <a:fontRef idx="minor">
+            <a:schemeClr val="lt1"/>
+          </a:fontRef>
+        </p:style>
+        <p:txBody>
+          <a:bodyPr rot="0" spcFirstLastPara="0" vert="horz" wrap="square" lIns="91440" tIns="45720" rIns="91440" bIns="45720" numCol="1" spcCol="0" rtlCol="0" fromWordArt="0" anchor="ctr" anchorCtr="0" forceAA="0" compatLnSpc="1">
+            <a:prstTxWarp prst="textNoShape">
+              <a:avLst/>
+            </a:prstTxWarp>
+            <a:noAutofit/>
+          </a:bodyPr>
+          <a:lstStyle/>
+          <a:p>
+            <a:endParaRPr lang="nl-NL"/>
+          </a:p>
+        </p:txBody>
+      </p:sp>
+      <p:sp>
+        <p:nvSpPr>
+          <p:cNvPr id="40" name="Text Box 69">
+            <a:extLst>
+              <a:ext uri="{FF2B5EF4-FFF2-40B4-BE49-F238E27FC236}">
+                <a16:creationId xmlns:a16="http://schemas.microsoft.com/office/drawing/2014/main" id="{9EA02E44-3FA4-4AFC-8D3B-8E157CD517A0}"/>
+              </a:ext>
+            </a:extLst>
+          </p:cNvPr>
+          <p:cNvSpPr txBox="1"/>
+          <p:nvPr/>
+        </p:nvSpPr>
+        <p:spPr>
+          <a:xfrm>
+            <a:off x="3962432" y="4888128"/>
+            <a:ext cx="300076" cy="124212"/>
+          </a:xfrm>
+          <a:prstGeom prst="rect">
+            <a:avLst/>
+          </a:prstGeom>
+          <a:noFill/>
+          <a:ln w="6350">
+            <a:noFill/>
+          </a:ln>
+        </p:spPr>
+        <p:txBody>
+          <a:bodyPr rot="0" spcFirstLastPara="0" vert="horz" wrap="square" lIns="0" tIns="0" rIns="0" bIns="0" numCol="1" spcCol="0" rtlCol="0" fromWordArt="0" anchor="t" anchorCtr="0" forceAA="0" compatLnSpc="1">
+            <a:prstTxWarp prst="textNoShape">
+              <a:avLst/>
+            </a:prstTxWarp>
+            <a:noAutofit/>
+          </a:bodyPr>
+          <a:lstStyle/>
+          <a:p>
+            <a:pPr marL="0" marR="0" algn="just">
+              <a:spcBef>
+                <a:spcPts val="0"/>
+              </a:spcBef>
+              <a:spcAft>
+                <a:spcPts val="500"/>
+              </a:spcAft>
+            </a:pPr>
+            <a:r>
+              <a:rPr lang="en-US" sz="950" b="1">
+                <a:effectLst/>
+                <a:latin typeface="Proxima Nova Lt" panose="02000506030000020004" pitchFamily="50" charset="0"/>
+                <a:ea typeface="Calibri" panose="020F0502020204030204" pitchFamily="34" charset="0"/>
+                <a:cs typeface="Times New Roman" panose="02020603050405020304" pitchFamily="18" charset="0"/>
+              </a:rPr>
+              <a:t>AR1</a:t>
+            </a:r>
+            <a:endParaRPr lang="nl-NL" sz="950">
+              <a:effectLst/>
+              <a:latin typeface="NimbusRomNo9L" panose="00000500000000000000" pitchFamily="50" charset="0"/>
+              <a:ea typeface="Calibri" panose="020F0502020204030204" pitchFamily="34" charset="0"/>
+              <a:cs typeface="Times New Roman" panose="02020603050405020304" pitchFamily="18" charset="0"/>
+            </a:endParaRPr>
+          </a:p>
+        </p:txBody>
+      </p:sp>
+    </p:spTree>
+    <p:extLst>
+      <p:ext uri="{BB962C8B-B14F-4D97-AF65-F5344CB8AC3E}">
+        <p14:creationId xmlns:p14="http://schemas.microsoft.com/office/powerpoint/2010/main" val="62024287"/>
+      </p:ext>
+    </p:extLst>
+  </p:cSld>
+  <p:clrMapOvr>
+    <a:masterClrMapping/>
+  </p:clrMapOvr>
+</p:sld>
+</file>
+
 <file path=ppt/theme/theme1.xml><?xml version="1.0" encoding="utf-8"?>
 <a:theme xmlns:a="http://schemas.openxmlformats.org/drawingml/2006/main" name="Office Theme">
   <a:themeElements>

</xml_diff>